<commit_message>
Updated SlideShow with My Graphs
</commit_message>
<xml_diff>
--- a/A Study of Coffee Production.pptx
+++ b/A Study of Coffee Production.pptx
@@ -6394,6 +6394,42 @@
           </a:p>
         </p:txBody>
       </p:sp>
+      <p:pic>
+        <p:nvPicPr>
+          <p:cNvPr id="4" name="Picture 3" descr="A graph of blue bars&#10;&#10;Description automatically generated with medium confidence">
+            <a:extLst>
+              <a:ext uri="{FF2B5EF4-FFF2-40B4-BE49-F238E27FC236}">
+                <a16:creationId xmlns:a16="http://schemas.microsoft.com/office/drawing/2014/main" id="{CA3824BC-7F23-DA7C-B839-4D99FB29C027}"/>
+              </a:ext>
+            </a:extLst>
+          </p:cNvPr>
+          <p:cNvPicPr>
+            <a:picLocks noChangeAspect="1"/>
+          </p:cNvPicPr>
+          <p:nvPr/>
+        </p:nvPicPr>
+        <p:blipFill>
+          <a:blip r:embed="rId2">
+            <a:extLst>
+              <a:ext uri="{28A0092B-C50C-407E-A947-70E740481C1C}">
+                <a14:useLocalDpi xmlns:a14="http://schemas.microsoft.com/office/drawing/2010/main" val="0"/>
+              </a:ext>
+            </a:extLst>
+          </a:blip>
+          <a:stretch>
+            <a:fillRect/>
+          </a:stretch>
+        </p:blipFill>
+        <p:spPr>
+          <a:xfrm>
+            <a:off x="1523991" y="92765"/>
+            <a:ext cx="9144018" cy="5486411"/>
+          </a:xfrm>
+          <a:prstGeom prst="rect">
+            <a:avLst/>
+          </a:prstGeom>
+        </p:spPr>
+      </p:pic>
     </p:spTree>
     <p:extLst>
       <p:ext uri="{BB962C8B-B14F-4D97-AF65-F5344CB8AC3E}">
@@ -6494,6 +6530,42 @@
           </a:p>
         </p:txBody>
       </p:sp>
+      <p:pic>
+        <p:nvPicPr>
+          <p:cNvPr id="4" name="Picture 3" descr="A graph of blue lines&#10;&#10;Description automatically generated with medium confidence">
+            <a:extLst>
+              <a:ext uri="{FF2B5EF4-FFF2-40B4-BE49-F238E27FC236}">
+                <a16:creationId xmlns:a16="http://schemas.microsoft.com/office/drawing/2014/main" id="{44AB07C4-60B6-9676-3E46-A6D4E22F4DD0}"/>
+              </a:ext>
+            </a:extLst>
+          </p:cNvPr>
+          <p:cNvPicPr>
+            <a:picLocks noChangeAspect="1"/>
+          </p:cNvPicPr>
+          <p:nvPr/>
+        </p:nvPicPr>
+        <p:blipFill>
+          <a:blip r:embed="rId2">
+            <a:extLst>
+              <a:ext uri="{28A0092B-C50C-407E-A947-70E740481C1C}">
+                <a14:useLocalDpi xmlns:a14="http://schemas.microsoft.com/office/drawing/2010/main" val="0"/>
+              </a:ext>
+            </a:extLst>
+          </a:blip>
+          <a:stretch>
+            <a:fillRect/>
+          </a:stretch>
+        </p:blipFill>
+        <p:spPr>
+          <a:xfrm>
+            <a:off x="1379135" y="92765"/>
+            <a:ext cx="9144018" cy="5486411"/>
+          </a:xfrm>
+          <a:prstGeom prst="rect">
+            <a:avLst/>
+          </a:prstGeom>
+        </p:spPr>
+      </p:pic>
     </p:spTree>
     <p:extLst>
       <p:ext uri="{BB962C8B-B14F-4D97-AF65-F5344CB8AC3E}">
@@ -8473,10 +8545,7 @@
           </a:bodyPr>
           <a:lstStyle/>
           <a:p>
-            <a:r>
-              <a:rPr lang="en-US" sz="2400" dirty="0"/>
-              <a:t>Mitch section space holder</a:t>
-            </a:r>
+            <a:endParaRPr lang="en-US" sz="2400" dirty="0"/>
           </a:p>
         </p:txBody>
       </p:sp>
@@ -8515,6 +8584,42 @@
           </a:p>
         </p:txBody>
       </p:sp>
+      <p:pic>
+        <p:nvPicPr>
+          <p:cNvPr id="8" name="Picture 7" descr="A graph of a number of people&#10;&#10;Description automatically generated with medium confidence">
+            <a:extLst>
+              <a:ext uri="{FF2B5EF4-FFF2-40B4-BE49-F238E27FC236}">
+                <a16:creationId xmlns:a16="http://schemas.microsoft.com/office/drawing/2014/main" id="{446537D7-2511-2E0B-C626-632368134CD1}"/>
+              </a:ext>
+            </a:extLst>
+          </p:cNvPr>
+          <p:cNvPicPr>
+            <a:picLocks noChangeAspect="1"/>
+          </p:cNvPicPr>
+          <p:nvPr/>
+        </p:nvPicPr>
+        <p:blipFill>
+          <a:blip r:embed="rId2">
+            <a:extLst>
+              <a:ext uri="{28A0092B-C50C-407E-A947-70E740481C1C}">
+                <a14:useLocalDpi xmlns:a14="http://schemas.microsoft.com/office/drawing/2010/main" val="0"/>
+              </a:ext>
+            </a:extLst>
+          </a:blip>
+          <a:stretch>
+            <a:fillRect/>
+          </a:stretch>
+        </p:blipFill>
+        <p:spPr>
+          <a:xfrm>
+            <a:off x="1900596" y="347929"/>
+            <a:ext cx="8112536" cy="5125615"/>
+          </a:xfrm>
+          <a:prstGeom prst="rect">
+            <a:avLst/>
+          </a:prstGeom>
+        </p:spPr>
+      </p:pic>
     </p:spTree>
     <p:extLst>
       <p:ext uri="{BB962C8B-B14F-4D97-AF65-F5344CB8AC3E}">
@@ -8545,6 +8650,42 @@
           <a:chExt cx="0" cy="0"/>
         </a:xfrm>
       </p:grpSpPr>
+      <p:pic>
+        <p:nvPicPr>
+          <p:cNvPr id="7" name="Picture 6" descr="A graph of blue rectangular bars&#10;&#10;Description automatically generated with medium confidence">
+            <a:extLst>
+              <a:ext uri="{FF2B5EF4-FFF2-40B4-BE49-F238E27FC236}">
+                <a16:creationId xmlns:a16="http://schemas.microsoft.com/office/drawing/2014/main" id="{BCD64477-8F48-5A71-0852-94D56F73196C}"/>
+              </a:ext>
+            </a:extLst>
+          </p:cNvPr>
+          <p:cNvPicPr>
+            <a:picLocks noChangeAspect="1"/>
+          </p:cNvPicPr>
+          <p:nvPr/>
+        </p:nvPicPr>
+        <p:blipFill>
+          <a:blip r:embed="rId2">
+            <a:extLst>
+              <a:ext uri="{28A0092B-C50C-407E-A947-70E740481C1C}">
+                <a14:useLocalDpi xmlns:a14="http://schemas.microsoft.com/office/drawing/2010/main" val="0"/>
+              </a:ext>
+            </a:extLst>
+          </a:blip>
+          <a:stretch>
+            <a:fillRect/>
+          </a:stretch>
+        </p:blipFill>
+        <p:spPr>
+          <a:xfrm>
+            <a:off x="1523991" y="0"/>
+            <a:ext cx="9144018" cy="5701085"/>
+          </a:xfrm>
+          <a:prstGeom prst="rect">
+            <a:avLst/>
+          </a:prstGeom>
+        </p:spPr>
+      </p:pic>
       <p:sp>
         <p:nvSpPr>
           <p:cNvPr id="2" name="Title 1">
@@ -8573,10 +8714,7 @@
           </a:bodyPr>
           <a:lstStyle/>
           <a:p>
-            <a:r>
-              <a:rPr lang="en-US" sz="2400" dirty="0"/>
-              <a:t>Mitch section space holder</a:t>
-            </a:r>
+            <a:endParaRPr lang="en-US" sz="2400" dirty="0"/>
           </a:p>
         </p:txBody>
       </p:sp>

</xml_diff>

<commit_message>
Updated Coffee Production Graphs
</commit_message>
<xml_diff>
--- a/A Study of Coffee Production.pptx
+++ b/A Study of Coffee Production.pptx
@@ -14,15 +14,18 @@
     <p:sldId id="264" r:id="rId8"/>
     <p:sldId id="269" r:id="rId9"/>
     <p:sldId id="274" r:id="rId10"/>
-    <p:sldId id="275" r:id="rId11"/>
-    <p:sldId id="273" r:id="rId12"/>
-    <p:sldId id="265" r:id="rId13"/>
-    <p:sldId id="266" r:id="rId14"/>
-    <p:sldId id="267" r:id="rId15"/>
-    <p:sldId id="268" r:id="rId16"/>
-    <p:sldId id="270" r:id="rId17"/>
-    <p:sldId id="271" r:id="rId18"/>
-    <p:sldId id="272" r:id="rId19"/>
+    <p:sldId id="276" r:id="rId11"/>
+    <p:sldId id="275" r:id="rId12"/>
+    <p:sldId id="273" r:id="rId13"/>
+    <p:sldId id="277" r:id="rId14"/>
+    <p:sldId id="278" r:id="rId15"/>
+    <p:sldId id="265" r:id="rId16"/>
+    <p:sldId id="266" r:id="rId17"/>
+    <p:sldId id="267" r:id="rId18"/>
+    <p:sldId id="268" r:id="rId19"/>
+    <p:sldId id="270" r:id="rId20"/>
+    <p:sldId id="271" r:id="rId21"/>
+    <p:sldId id="272" r:id="rId22"/>
   </p:sldIdLst>
   <p:sldSz cx="12192000" cy="6858000"/>
   <p:notesSz cx="6858000" cy="9144000"/>
@@ -129,6 +132,421 @@
 </p:presentation>
 </file>
 
+<file path=ppt/revisionInfo.xml><?xml version="1.0" encoding="utf-8"?>
+<p1510:revInfo xmlns:a="http://schemas.openxmlformats.org/drawingml/2006/main" xmlns:r="http://schemas.openxmlformats.org/officeDocument/2006/relationships" xmlns:p1510="http://schemas.microsoft.com/office/powerpoint/2015/10/main">
+  <p1510:revLst>
+    <p1510:client id="{8E4CCB9F-856B-4486-82D7-26C124C3AB48}" v="7" dt="2024-04-18T00:23:38.785"/>
+  </p1510:revLst>
+</p1510:revInfo>
+</file>
+
+<file path=ppt/changesInfos/changesInfo1.xml><?xml version="1.0" encoding="utf-8"?>
+<pc:chgInfo xmlns:a="http://schemas.openxmlformats.org/drawingml/2006/main" xmlns:r="http://schemas.openxmlformats.org/officeDocument/2006/relationships" xmlns:ac="http://schemas.microsoft.com/office/drawing/2013/main/command" xmlns:pc="http://schemas.microsoft.com/office/powerpoint/2013/main/command">
+  <pc:docChgLst>
+    <pc:chgData name="Mitchell Hatchett" userId="c58322c0a5d5c61d" providerId="LiveId" clId="{8E4CCB9F-856B-4486-82D7-26C124C3AB48}"/>
+    <pc:docChg chg="undo custSel addSld modSld">
+      <pc:chgData name="Mitchell Hatchett" userId="c58322c0a5d5c61d" providerId="LiveId" clId="{8E4CCB9F-856B-4486-82D7-26C124C3AB48}" dt="2024-04-18T00:23:57.876" v="1047" actId="20577"/>
+      <pc:docMkLst>
+        <pc:docMk/>
+      </pc:docMkLst>
+      <pc:sldChg chg="addSp delSp modSp mod modClrScheme chgLayout">
+        <pc:chgData name="Mitchell Hatchett" userId="c58322c0a5d5c61d" providerId="LiveId" clId="{8E4CCB9F-856B-4486-82D7-26C124C3AB48}" dt="2024-04-17T23:55:33.277" v="261" actId="26606"/>
+        <pc:sldMkLst>
+          <pc:docMk/>
+          <pc:sldMk cId="1286670627" sldId="269"/>
+        </pc:sldMkLst>
+        <pc:spChg chg="del">
+          <ac:chgData name="Mitchell Hatchett" userId="c58322c0a5d5c61d" providerId="LiveId" clId="{8E4CCB9F-856B-4486-82D7-26C124C3AB48}" dt="2024-04-17T23:47:05.723" v="1" actId="478"/>
+          <ac:spMkLst>
+            <pc:docMk/>
+            <pc:sldMk cId="1286670627" sldId="269"/>
+            <ac:spMk id="2" creationId="{4E50B996-81AE-4E75-1F3D-1FBFBC318B4A}"/>
+          </ac:spMkLst>
+        </pc:spChg>
+        <pc:spChg chg="del mod">
+          <ac:chgData name="Mitchell Hatchett" userId="c58322c0a5d5c61d" providerId="LiveId" clId="{8E4CCB9F-856B-4486-82D7-26C124C3AB48}" dt="2024-04-17T23:54:43.776" v="252"/>
+          <ac:spMkLst>
+            <pc:docMk/>
+            <pc:sldMk cId="1286670627" sldId="269"/>
+            <ac:spMk id="5" creationId="{D1E369A4-07E9-E30A-5237-6149C7EAC6BF}"/>
+          </ac:spMkLst>
+        </pc:spChg>
+        <pc:spChg chg="add del mod">
+          <ac:chgData name="Mitchell Hatchett" userId="c58322c0a5d5c61d" providerId="LiveId" clId="{8E4CCB9F-856B-4486-82D7-26C124C3AB48}" dt="2024-04-17T23:55:31.750" v="258" actId="26606"/>
+          <ac:spMkLst>
+            <pc:docMk/>
+            <pc:sldMk cId="1286670627" sldId="269"/>
+            <ac:spMk id="13" creationId="{9385FE86-B0DB-158E-241C-296513F2B0A4}"/>
+          </ac:spMkLst>
+        </pc:spChg>
+        <pc:picChg chg="mod">
+          <ac:chgData name="Mitchell Hatchett" userId="c58322c0a5d5c61d" providerId="LiveId" clId="{8E4CCB9F-856B-4486-82D7-26C124C3AB48}" dt="2024-04-17T23:55:33.277" v="261" actId="26606"/>
+          <ac:picMkLst>
+            <pc:docMk/>
+            <pc:sldMk cId="1286670627" sldId="269"/>
+            <ac:picMk id="8" creationId="{446537D7-2511-2E0B-C626-632368134CD1}"/>
+          </ac:picMkLst>
+        </pc:picChg>
+      </pc:sldChg>
+      <pc:sldChg chg="modSp mod modClrScheme chgLayout">
+        <pc:chgData name="Mitchell Hatchett" userId="c58322c0a5d5c61d" providerId="LiveId" clId="{8E4CCB9F-856B-4486-82D7-26C124C3AB48}" dt="2024-04-18T00:04:17.643" v="998" actId="20577"/>
+        <pc:sldMkLst>
+          <pc:docMk/>
+          <pc:sldMk cId="2762001895" sldId="273"/>
+        </pc:sldMkLst>
+        <pc:spChg chg="mod">
+          <ac:chgData name="Mitchell Hatchett" userId="c58322c0a5d5c61d" providerId="LiveId" clId="{8E4CCB9F-856B-4486-82D7-26C124C3AB48}" dt="2024-04-18T00:04:17.643" v="998" actId="20577"/>
+          <ac:spMkLst>
+            <pc:docMk/>
+            <pc:sldMk cId="2762001895" sldId="273"/>
+            <ac:spMk id="2" creationId="{4E50B996-81AE-4E75-1F3D-1FBFBC318B4A}"/>
+          </ac:spMkLst>
+        </pc:spChg>
+        <pc:spChg chg="mod ord">
+          <ac:chgData name="Mitchell Hatchett" userId="c58322c0a5d5c61d" providerId="LiveId" clId="{8E4CCB9F-856B-4486-82D7-26C124C3AB48}" dt="2024-04-18T00:03:59.404" v="954" actId="26606"/>
+          <ac:spMkLst>
+            <pc:docMk/>
+            <pc:sldMk cId="2762001895" sldId="273"/>
+            <ac:spMk id="5" creationId="{D1E369A4-07E9-E30A-5237-6149C7EAC6BF}"/>
+          </ac:spMkLst>
+        </pc:spChg>
+        <pc:picChg chg="mod">
+          <ac:chgData name="Mitchell Hatchett" userId="c58322c0a5d5c61d" providerId="LiveId" clId="{8E4CCB9F-856B-4486-82D7-26C124C3AB48}" dt="2024-04-18T00:03:59.404" v="954" actId="26606"/>
+          <ac:picMkLst>
+            <pc:docMk/>
+            <pc:sldMk cId="2762001895" sldId="273"/>
+            <ac:picMk id="4" creationId="{44AB07C4-60B6-9676-3E46-A6D4E22F4DD0}"/>
+          </ac:picMkLst>
+        </pc:picChg>
+      </pc:sldChg>
+      <pc:sldChg chg="addSp delSp modSp mod modClrScheme chgLayout">
+        <pc:chgData name="Mitchell Hatchett" userId="c58322c0a5d5c61d" providerId="LiveId" clId="{8E4CCB9F-856B-4486-82D7-26C124C3AB48}" dt="2024-04-18T00:01:22.727" v="592" actId="26606"/>
+        <pc:sldMkLst>
+          <pc:docMk/>
+          <pc:sldMk cId="2889487596" sldId="274"/>
+        </pc:sldMkLst>
+        <pc:spChg chg="del">
+          <ac:chgData name="Mitchell Hatchett" userId="c58322c0a5d5c61d" providerId="LiveId" clId="{8E4CCB9F-856B-4486-82D7-26C124C3AB48}" dt="2024-04-17T23:46:56.121" v="0" actId="478"/>
+          <ac:spMkLst>
+            <pc:docMk/>
+            <pc:sldMk cId="2889487596" sldId="274"/>
+            <ac:spMk id="2" creationId="{4E50B996-81AE-4E75-1F3D-1FBFBC318B4A}"/>
+          </ac:spMkLst>
+        </pc:spChg>
+        <pc:spChg chg="add mod ord">
+          <ac:chgData name="Mitchell Hatchett" userId="c58322c0a5d5c61d" providerId="LiveId" clId="{8E4CCB9F-856B-4486-82D7-26C124C3AB48}" dt="2024-04-18T00:01:22.727" v="592" actId="26606"/>
+          <ac:spMkLst>
+            <pc:docMk/>
+            <pc:sldMk cId="2889487596" sldId="274"/>
+            <ac:spMk id="3" creationId="{7383A721-BC00-1BE8-83FA-A81C29FC8DEC}"/>
+          </ac:spMkLst>
+        </pc:spChg>
+        <pc:spChg chg="del mod">
+          <ac:chgData name="Mitchell Hatchett" userId="c58322c0a5d5c61d" providerId="LiveId" clId="{8E4CCB9F-856B-4486-82D7-26C124C3AB48}" dt="2024-04-17T23:48:14.289" v="111"/>
+          <ac:spMkLst>
+            <pc:docMk/>
+            <pc:sldMk cId="2889487596" sldId="274"/>
+            <ac:spMk id="5" creationId="{D1E369A4-07E9-E30A-5237-6149C7EAC6BF}"/>
+          </ac:spMkLst>
+        </pc:spChg>
+        <pc:spChg chg="add del mod">
+          <ac:chgData name="Mitchell Hatchett" userId="c58322c0a5d5c61d" providerId="LiveId" clId="{8E4CCB9F-856B-4486-82D7-26C124C3AB48}" dt="2024-04-17T23:54:04.416" v="195" actId="26606"/>
+          <ac:spMkLst>
+            <pc:docMk/>
+            <pc:sldMk cId="2889487596" sldId="274"/>
+            <ac:spMk id="6" creationId="{F6AD654D-BDD4-FC71-8746-32E3A2F9867C}"/>
+          </ac:spMkLst>
+        </pc:spChg>
+        <pc:spChg chg="add mod">
+          <ac:chgData name="Mitchell Hatchett" userId="c58322c0a5d5c61d" providerId="LiveId" clId="{8E4CCB9F-856B-4486-82D7-26C124C3AB48}" dt="2024-04-18T00:01:22.727" v="592" actId="26606"/>
+          <ac:spMkLst>
+            <pc:docMk/>
+            <pc:sldMk cId="2889487596" sldId="274"/>
+            <ac:spMk id="8" creationId="{79A1700D-FD9E-29D8-1BFA-96FC3C7A28AA}"/>
+          </ac:spMkLst>
+        </pc:spChg>
+        <pc:spChg chg="add del mod">
+          <ac:chgData name="Mitchell Hatchett" userId="c58322c0a5d5c61d" providerId="LiveId" clId="{8E4CCB9F-856B-4486-82D7-26C124C3AB48}" dt="2024-04-17T23:53:55.031" v="187" actId="26606"/>
+          <ac:spMkLst>
+            <pc:docMk/>
+            <pc:sldMk cId="2889487596" sldId="274"/>
+            <ac:spMk id="9" creationId="{638D7510-F547-997E-AD6E-BD1B0DB1B3D2}"/>
+          </ac:spMkLst>
+        </pc:spChg>
+        <pc:spChg chg="add del mod">
+          <ac:chgData name="Mitchell Hatchett" userId="c58322c0a5d5c61d" providerId="LiveId" clId="{8E4CCB9F-856B-4486-82D7-26C124C3AB48}" dt="2024-04-17T23:53:55.972" v="189" actId="26606"/>
+          <ac:spMkLst>
+            <pc:docMk/>
+            <pc:sldMk cId="2889487596" sldId="274"/>
+            <ac:spMk id="11" creationId="{59AD412C-AF8A-BF79-B3FE-EE70C4D3E8CC}"/>
+          </ac:spMkLst>
+        </pc:spChg>
+        <pc:spChg chg="add del mod">
+          <ac:chgData name="Mitchell Hatchett" userId="c58322c0a5d5c61d" providerId="LiveId" clId="{8E4CCB9F-856B-4486-82D7-26C124C3AB48}" dt="2024-04-17T23:53:56.415" v="191" actId="26606"/>
+          <ac:spMkLst>
+            <pc:docMk/>
+            <pc:sldMk cId="2889487596" sldId="274"/>
+            <ac:spMk id="13" creationId="{F6AD654D-BDD4-FC71-8746-32E3A2F9867C}"/>
+          </ac:spMkLst>
+        </pc:spChg>
+        <pc:picChg chg="add mod">
+          <ac:chgData name="Mitchell Hatchett" userId="c58322c0a5d5c61d" providerId="LiveId" clId="{8E4CCB9F-856B-4486-82D7-26C124C3AB48}" dt="2024-04-18T00:01:22.727" v="592" actId="26606"/>
+          <ac:picMkLst>
+            <pc:docMk/>
+            <pc:sldMk cId="2889487596" sldId="274"/>
+            <ac:picMk id="4" creationId="{544EF777-4FD6-3B1A-B255-7EDBD1D09943}"/>
+          </ac:picMkLst>
+        </pc:picChg>
+        <pc:picChg chg="del mod">
+          <ac:chgData name="Mitchell Hatchett" userId="c58322c0a5d5c61d" providerId="LiveId" clId="{8E4CCB9F-856B-4486-82D7-26C124C3AB48}" dt="2024-04-17T23:53:15.068" v="182" actId="478"/>
+          <ac:picMkLst>
+            <pc:docMk/>
+            <pc:sldMk cId="2889487596" sldId="274"/>
+            <ac:picMk id="7" creationId="{BCD64477-8F48-5A71-0852-94D56F73196C}"/>
+          </ac:picMkLst>
+        </pc:picChg>
+      </pc:sldChg>
+      <pc:sldChg chg="modSp mod modClrScheme chgLayout">
+        <pc:chgData name="Mitchell Hatchett" userId="c58322c0a5d5c61d" providerId="LiveId" clId="{8E4CCB9F-856B-4486-82D7-26C124C3AB48}" dt="2024-04-18T00:03:00.483" v="790" actId="20577"/>
+        <pc:sldMkLst>
+          <pc:docMk/>
+          <pc:sldMk cId="2406737080" sldId="275"/>
+        </pc:sldMkLst>
+        <pc:spChg chg="mod">
+          <ac:chgData name="Mitchell Hatchett" userId="c58322c0a5d5c61d" providerId="LiveId" clId="{8E4CCB9F-856B-4486-82D7-26C124C3AB48}" dt="2024-04-18T00:03:00.483" v="790" actId="20577"/>
+          <ac:spMkLst>
+            <pc:docMk/>
+            <pc:sldMk cId="2406737080" sldId="275"/>
+            <ac:spMk id="2" creationId="{4E50B996-81AE-4E75-1F3D-1FBFBC318B4A}"/>
+          </ac:spMkLst>
+        </pc:spChg>
+        <pc:spChg chg="mod ord">
+          <ac:chgData name="Mitchell Hatchett" userId="c58322c0a5d5c61d" providerId="LiveId" clId="{8E4CCB9F-856B-4486-82D7-26C124C3AB48}" dt="2024-04-18T00:02:35.557" v="732" actId="26606"/>
+          <ac:spMkLst>
+            <pc:docMk/>
+            <pc:sldMk cId="2406737080" sldId="275"/>
+            <ac:spMk id="5" creationId="{D1E369A4-07E9-E30A-5237-6149C7EAC6BF}"/>
+          </ac:spMkLst>
+        </pc:spChg>
+        <pc:picChg chg="mod">
+          <ac:chgData name="Mitchell Hatchett" userId="c58322c0a5d5c61d" providerId="LiveId" clId="{8E4CCB9F-856B-4486-82D7-26C124C3AB48}" dt="2024-04-18T00:02:35.557" v="732" actId="26606"/>
+          <ac:picMkLst>
+            <pc:docMk/>
+            <pc:sldMk cId="2406737080" sldId="275"/>
+            <ac:picMk id="4" creationId="{CA3824BC-7F23-DA7C-B839-4D99FB29C027}"/>
+          </ac:picMkLst>
+        </pc:picChg>
+      </pc:sldChg>
+      <pc:sldChg chg="addSp delSp modSp new mod modClrScheme chgLayout">
+        <pc:chgData name="Mitchell Hatchett" userId="c58322c0a5d5c61d" providerId="LiveId" clId="{8E4CCB9F-856B-4486-82D7-26C124C3AB48}" dt="2024-04-18T00:01:10.037" v="591" actId="26606"/>
+        <pc:sldMkLst>
+          <pc:docMk/>
+          <pc:sldMk cId="1978639848" sldId="276"/>
+        </pc:sldMkLst>
+        <pc:spChg chg="mod">
+          <ac:chgData name="Mitchell Hatchett" userId="c58322c0a5d5c61d" providerId="LiveId" clId="{8E4CCB9F-856B-4486-82D7-26C124C3AB48}" dt="2024-04-18T00:01:10.037" v="591" actId="26606"/>
+          <ac:spMkLst>
+            <pc:docMk/>
+            <pc:sldMk cId="1978639848" sldId="276"/>
+            <ac:spMk id="2" creationId="{16635E81-7C42-016D-24B9-C03FF7C9118A}"/>
+          </ac:spMkLst>
+        </pc:spChg>
+        <pc:spChg chg="del">
+          <ac:chgData name="Mitchell Hatchett" userId="c58322c0a5d5c61d" providerId="LiveId" clId="{8E4CCB9F-856B-4486-82D7-26C124C3AB48}" dt="2024-04-17T23:57:06.697" v="468" actId="931"/>
+          <ac:spMkLst>
+            <pc:docMk/>
+            <pc:sldMk cId="1978639848" sldId="276"/>
+            <ac:spMk id="3" creationId="{43BC63C6-EFAF-7FBC-437F-F4B9D3DEE1FD}"/>
+          </ac:spMkLst>
+        </pc:spChg>
+        <pc:spChg chg="del">
+          <ac:chgData name="Mitchell Hatchett" userId="c58322c0a5d5c61d" providerId="LiveId" clId="{8E4CCB9F-856B-4486-82D7-26C124C3AB48}" dt="2024-04-18T00:00:13.098" v="516" actId="26606"/>
+          <ac:spMkLst>
+            <pc:docMk/>
+            <pc:sldMk cId="1978639848" sldId="276"/>
+            <ac:spMk id="4" creationId="{772A03F4-73A9-1CFD-D37C-2234E56F4B55}"/>
+          </ac:spMkLst>
+        </pc:spChg>
+        <pc:spChg chg="add del mod">
+          <ac:chgData name="Mitchell Hatchett" userId="c58322c0a5d5c61d" providerId="LiveId" clId="{8E4CCB9F-856B-4486-82D7-26C124C3AB48}" dt="2024-04-17T23:59:59.163" v="513" actId="931"/>
+          <ac:spMkLst>
+            <pc:docMk/>
+            <pc:sldMk cId="1978639848" sldId="276"/>
+            <ac:spMk id="8" creationId="{EAAE0879-D084-BB70-1C7C-587A24CC837F}"/>
+          </ac:spMkLst>
+        </pc:spChg>
+        <pc:spChg chg="add mod">
+          <ac:chgData name="Mitchell Hatchett" userId="c58322c0a5d5c61d" providerId="LiveId" clId="{8E4CCB9F-856B-4486-82D7-26C124C3AB48}" dt="2024-04-18T00:01:10.037" v="591" actId="26606"/>
+          <ac:spMkLst>
+            <pc:docMk/>
+            <pc:sldMk cId="1978639848" sldId="276"/>
+            <ac:spMk id="15" creationId="{060921CC-50CD-793A-0E10-673D1F89DA51}"/>
+          </ac:spMkLst>
+        </pc:spChg>
+        <pc:picChg chg="add del mod">
+          <ac:chgData name="Mitchell Hatchett" userId="c58322c0a5d5c61d" providerId="LiveId" clId="{8E4CCB9F-856B-4486-82D7-26C124C3AB48}" dt="2024-04-17T23:57:15.847" v="471" actId="478"/>
+          <ac:picMkLst>
+            <pc:docMk/>
+            <pc:sldMk cId="1978639848" sldId="276"/>
+            <ac:picMk id="6" creationId="{7E0CFFFD-DD7D-7B39-E9CC-AD4B5A2F160F}"/>
+          </ac:picMkLst>
+        </pc:picChg>
+        <pc:picChg chg="add mod">
+          <ac:chgData name="Mitchell Hatchett" userId="c58322c0a5d5c61d" providerId="LiveId" clId="{8E4CCB9F-856B-4486-82D7-26C124C3AB48}" dt="2024-04-18T00:01:10.037" v="591" actId="26606"/>
+          <ac:picMkLst>
+            <pc:docMk/>
+            <pc:sldMk cId="1978639848" sldId="276"/>
+            <ac:picMk id="10" creationId="{9C0D097C-B5D0-2B3D-6250-491558FFB147}"/>
+          </ac:picMkLst>
+        </pc:picChg>
+      </pc:sldChg>
+      <pc:sldChg chg="addSp delSp modSp new mod modClrScheme chgLayout">
+        <pc:chgData name="Mitchell Hatchett" userId="c58322c0a5d5c61d" providerId="LiveId" clId="{8E4CCB9F-856B-4486-82D7-26C124C3AB48}" dt="2024-04-18T00:23:00.467" v="1006"/>
+        <pc:sldMkLst>
+          <pc:docMk/>
+          <pc:sldMk cId="3215587714" sldId="277"/>
+        </pc:sldMkLst>
+        <pc:spChg chg="del">
+          <ac:chgData name="Mitchell Hatchett" userId="c58322c0a5d5c61d" providerId="LiveId" clId="{8E4CCB9F-856B-4486-82D7-26C124C3AB48}" dt="2024-04-18T00:10:04.664" v="1003" actId="26606"/>
+          <ac:spMkLst>
+            <pc:docMk/>
+            <pc:sldMk cId="3215587714" sldId="277"/>
+            <ac:spMk id="2" creationId="{0EDEEE48-EC59-616C-F625-6DF888CA8640}"/>
+          </ac:spMkLst>
+        </pc:spChg>
+        <pc:spChg chg="del">
+          <ac:chgData name="Mitchell Hatchett" userId="c58322c0a5d5c61d" providerId="LiveId" clId="{8E4CCB9F-856B-4486-82D7-26C124C3AB48}" dt="2024-04-18T00:10:01.468" v="1000" actId="931"/>
+          <ac:spMkLst>
+            <pc:docMk/>
+            <pc:sldMk cId="3215587714" sldId="277"/>
+            <ac:spMk id="3" creationId="{4DECA61E-6C6A-961F-3031-78E65C82216C}"/>
+          </ac:spMkLst>
+        </pc:spChg>
+        <pc:spChg chg="del">
+          <ac:chgData name="Mitchell Hatchett" userId="c58322c0a5d5c61d" providerId="LiveId" clId="{8E4CCB9F-856B-4486-82D7-26C124C3AB48}" dt="2024-04-18T00:10:04.664" v="1003" actId="26606"/>
+          <ac:spMkLst>
+            <pc:docMk/>
+            <pc:sldMk cId="3215587714" sldId="277"/>
+            <ac:spMk id="4" creationId="{BD6DEFAF-503D-8DCF-9AF4-035209B09728}"/>
+          </ac:spMkLst>
+        </pc:spChg>
+        <pc:spChg chg="add del mod">
+          <ac:chgData name="Mitchell Hatchett" userId="c58322c0a5d5c61d" providerId="LiveId" clId="{8E4CCB9F-856B-4486-82D7-26C124C3AB48}" dt="2024-04-18T00:10:40.801" v="1004" actId="26606"/>
+          <ac:spMkLst>
+            <pc:docMk/>
+            <pc:sldMk cId="3215587714" sldId="277"/>
+            <ac:spMk id="11" creationId="{F849820A-84C2-FD4E-78AB-DFA3B9B962C1}"/>
+          </ac:spMkLst>
+        </pc:spChg>
+        <pc:spChg chg="add del mod">
+          <ac:chgData name="Mitchell Hatchett" userId="c58322c0a5d5c61d" providerId="LiveId" clId="{8E4CCB9F-856B-4486-82D7-26C124C3AB48}" dt="2024-04-18T00:10:40.801" v="1004" actId="26606"/>
+          <ac:spMkLst>
+            <pc:docMk/>
+            <pc:sldMk cId="3215587714" sldId="277"/>
+            <ac:spMk id="13" creationId="{31C0CD31-07B4-A826-8FBD-948D9B587D15}"/>
+          </ac:spMkLst>
+        </pc:spChg>
+        <pc:spChg chg="add mod">
+          <ac:chgData name="Mitchell Hatchett" userId="c58322c0a5d5c61d" providerId="LiveId" clId="{8E4CCB9F-856B-4486-82D7-26C124C3AB48}" dt="2024-04-18T00:22:55.367" v="1005"/>
+          <ac:spMkLst>
+            <pc:docMk/>
+            <pc:sldMk cId="3215587714" sldId="277"/>
+            <ac:spMk id="18" creationId="{A8B65ABF-AF7F-4AFC-B7FB-63EE492E2948}"/>
+          </ac:spMkLst>
+        </pc:spChg>
+        <pc:spChg chg="add mod">
+          <ac:chgData name="Mitchell Hatchett" userId="c58322c0a5d5c61d" providerId="LiveId" clId="{8E4CCB9F-856B-4486-82D7-26C124C3AB48}" dt="2024-04-18T00:23:00.467" v="1006"/>
+          <ac:spMkLst>
+            <pc:docMk/>
+            <pc:sldMk cId="3215587714" sldId="277"/>
+            <ac:spMk id="20" creationId="{DD5BE557-09E1-FF46-6AF2-8D2A3CDEECAF}"/>
+          </ac:spMkLst>
+        </pc:spChg>
+        <pc:picChg chg="add mod">
+          <ac:chgData name="Mitchell Hatchett" userId="c58322c0a5d5c61d" providerId="LiveId" clId="{8E4CCB9F-856B-4486-82D7-26C124C3AB48}" dt="2024-04-18T00:10:40.801" v="1004" actId="26606"/>
+          <ac:picMkLst>
+            <pc:docMk/>
+            <pc:sldMk cId="3215587714" sldId="277"/>
+            <ac:picMk id="6" creationId="{091DA132-6F4E-FFB9-6C33-99FDDE631735}"/>
+          </ac:picMkLst>
+        </pc:picChg>
+      </pc:sldChg>
+      <pc:sldChg chg="addSp delSp modSp new mod modClrScheme chgLayout">
+        <pc:chgData name="Mitchell Hatchett" userId="c58322c0a5d5c61d" providerId="LiveId" clId="{8E4CCB9F-856B-4486-82D7-26C124C3AB48}" dt="2024-04-18T00:23:57.876" v="1047" actId="20577"/>
+        <pc:sldMkLst>
+          <pc:docMk/>
+          <pc:sldMk cId="1536241654" sldId="278"/>
+        </pc:sldMkLst>
+        <pc:spChg chg="del">
+          <ac:chgData name="Mitchell Hatchett" userId="c58322c0a5d5c61d" providerId="LiveId" clId="{8E4CCB9F-856B-4486-82D7-26C124C3AB48}" dt="2024-04-18T00:23:40.373" v="1014" actId="26606"/>
+          <ac:spMkLst>
+            <pc:docMk/>
+            <pc:sldMk cId="1536241654" sldId="278"/>
+            <ac:spMk id="2" creationId="{A213AF47-0A17-41E1-34F8-F69192056DBB}"/>
+          </ac:spMkLst>
+        </pc:spChg>
+        <pc:spChg chg="del">
+          <ac:chgData name="Mitchell Hatchett" userId="c58322c0a5d5c61d" providerId="LiveId" clId="{8E4CCB9F-856B-4486-82D7-26C124C3AB48}" dt="2024-04-18T00:23:29.849" v="1008" actId="931"/>
+          <ac:spMkLst>
+            <pc:docMk/>
+            <pc:sldMk cId="1536241654" sldId="278"/>
+            <ac:spMk id="3" creationId="{B7BBA2C6-A4D8-1B35-3B08-5BAB2027A4FB}"/>
+          </ac:spMkLst>
+        </pc:spChg>
+        <pc:spChg chg="del">
+          <ac:chgData name="Mitchell Hatchett" userId="c58322c0a5d5c61d" providerId="LiveId" clId="{8E4CCB9F-856B-4486-82D7-26C124C3AB48}" dt="2024-04-18T00:23:40.373" v="1014" actId="26606"/>
+          <ac:spMkLst>
+            <pc:docMk/>
+            <pc:sldMk cId="1536241654" sldId="278"/>
+            <ac:spMk id="4" creationId="{543E6425-DE8E-D7B8-E5FA-09C4E4DED205}"/>
+          </ac:spMkLst>
+        </pc:spChg>
+        <pc:spChg chg="add mod">
+          <ac:chgData name="Mitchell Hatchett" userId="c58322c0a5d5c61d" providerId="LiveId" clId="{8E4CCB9F-856B-4486-82D7-26C124C3AB48}" dt="2024-04-18T00:23:57.876" v="1047" actId="20577"/>
+          <ac:spMkLst>
+            <pc:docMk/>
+            <pc:sldMk cId="1536241654" sldId="278"/>
+            <ac:spMk id="13" creationId="{F7C0F441-74BB-4A51-F58B-BC1702343F57}"/>
+          </ac:spMkLst>
+        </pc:spChg>
+        <pc:spChg chg="add mod">
+          <ac:chgData name="Mitchell Hatchett" userId="c58322c0a5d5c61d" providerId="LiveId" clId="{8E4CCB9F-856B-4486-82D7-26C124C3AB48}" dt="2024-04-18T00:23:49.988" v="1025" actId="20577"/>
+          <ac:spMkLst>
+            <pc:docMk/>
+            <pc:sldMk cId="1536241654" sldId="278"/>
+            <ac:spMk id="15" creationId="{33CD28B0-C927-1D0B-E093-F1FF2FB7CB7A}"/>
+          </ac:spMkLst>
+        </pc:spChg>
+        <pc:spChg chg="add mod">
+          <ac:chgData name="Mitchell Hatchett" userId="c58322c0a5d5c61d" providerId="LiveId" clId="{8E4CCB9F-856B-4486-82D7-26C124C3AB48}" dt="2024-04-18T00:23:44.771" v="1020" actId="20577"/>
+          <ac:spMkLst>
+            <pc:docMk/>
+            <pc:sldMk cId="1536241654" sldId="278"/>
+            <ac:spMk id="17" creationId="{B435B09D-DD80-FEC6-58C2-2AE2C752D245}"/>
+          </ac:spMkLst>
+        </pc:spChg>
+        <pc:picChg chg="add mod">
+          <ac:chgData name="Mitchell Hatchett" userId="c58322c0a5d5c61d" providerId="LiveId" clId="{8E4CCB9F-856B-4486-82D7-26C124C3AB48}" dt="2024-04-18T00:23:40.373" v="1014" actId="26606"/>
+          <ac:picMkLst>
+            <pc:docMk/>
+            <pc:sldMk cId="1536241654" sldId="278"/>
+            <ac:picMk id="6" creationId="{E4F9775A-DF1E-75C2-46FB-C0520B94B880}"/>
+          </ac:picMkLst>
+        </pc:picChg>
+        <pc:picChg chg="add mod">
+          <ac:chgData name="Mitchell Hatchett" userId="c58322c0a5d5c61d" providerId="LiveId" clId="{8E4CCB9F-856B-4486-82D7-26C124C3AB48}" dt="2024-04-18T00:23:40.373" v="1014" actId="26606"/>
+          <ac:picMkLst>
+            <pc:docMk/>
+            <pc:sldMk cId="1536241654" sldId="278"/>
+            <ac:picMk id="8" creationId="{9EA27A98-CD77-5B66-0AA3-DE9A55ABEBD6}"/>
+          </ac:picMkLst>
+        </pc:picChg>
+      </pc:sldChg>
+    </pc:docChg>
+  </pc:docChgLst>
+</pc:chgInfo>
+</file>
+
 <file path=ppt/slideLayouts/slideLayout1.xml><?xml version="1.0" encoding="utf-8"?>
 <p:sldLayout xmlns:a="http://schemas.openxmlformats.org/drawingml/2006/main" xmlns:r="http://schemas.openxmlformats.org/officeDocument/2006/relationships" xmlns:p="http://schemas.openxmlformats.org/presentationml/2006/main" type="title" preserve="1">
   <p:cSld name="Title Slide">
@@ -314,7 +732,7 @@
           <a:p>
             <a:fld id="{88D38747-4367-4BD2-8D51-C97E202738E2}" type="datetime1">
               <a:rPr lang="en-US" smtClean="0"/>
-              <a:t>4/16/2024</a:t>
+              <a:t>4/17/2024</a:t>
             </a:fld>
             <a:endParaRPr lang="en-US" dirty="0"/>
           </a:p>
@@ -619,7 +1037,7 @@
           <a:p>
             <a:fld id="{11F1B079-7EF0-44EE-B798-BCC497C9F3B2}" type="datetime1">
               <a:rPr lang="en-US" smtClean="0"/>
-              <a:t>4/16/2024</a:t>
+              <a:t>4/17/2024</a:t>
             </a:fld>
             <a:endParaRPr lang="en-US" dirty="0"/>
           </a:p>
@@ -813,7 +1231,7 @@
           <a:p>
             <a:fld id="{28FF70A8-1D13-4657-95F0-A9EA54967B8D}" type="datetime1">
               <a:rPr lang="en-US" smtClean="0"/>
-              <a:t>4/16/2024</a:t>
+              <a:t>4/17/2024</a:t>
             </a:fld>
             <a:endParaRPr lang="en-US" dirty="0"/>
           </a:p>
@@ -1076,7 +1494,7 @@
           <a:p>
             <a:fld id="{21EB90AC-71BD-4C7F-8ACA-7B3F18292E63}" type="datetime1">
               <a:rPr lang="en-US" smtClean="0"/>
-              <a:t>4/16/2024</a:t>
+              <a:t>4/17/2024</a:t>
             </a:fld>
             <a:endParaRPr lang="en-US" dirty="0"/>
           </a:p>
@@ -1512,7 +1930,7 @@
           <a:p>
             <a:fld id="{4E6EFC2C-8905-46F0-B443-CE905B76BA01}" type="datetime1">
               <a:rPr lang="en-US" smtClean="0"/>
-              <a:t>4/16/2024</a:t>
+              <a:t>4/17/2024</a:t>
             </a:fld>
             <a:endParaRPr lang="en-US" dirty="0"/>
           </a:p>
@@ -2049,7 +2467,7 @@
           <a:p>
             <a:fld id="{D9079DC3-C9B5-499E-9140-0DC28B7074E2}" type="datetime1">
               <a:rPr lang="en-US" smtClean="0"/>
-              <a:t>4/16/2024</a:t>
+              <a:t>4/17/2024</a:t>
             </a:fld>
             <a:endParaRPr lang="en-US" dirty="0"/>
           </a:p>
@@ -2931,7 +3349,7 @@
           <a:p>
             <a:fld id="{30BB33EA-E472-4D22-9C03-A9C14AA21CED}" type="datetime1">
               <a:rPr lang="en-US" smtClean="0"/>
-              <a:t>4/16/2024</a:t>
+              <a:t>4/17/2024</a:t>
             </a:fld>
             <a:endParaRPr lang="en-US" dirty="0"/>
           </a:p>
@@ -3101,7 +3519,7 @@
           <a:p>
             <a:fld id="{217E833E-1B6D-415F-AD29-75AE8C43BD0D}" type="datetime1">
               <a:rPr lang="en-US" smtClean="0"/>
-              <a:t>4/16/2024</a:t>
+              <a:t>4/17/2024</a:t>
             </a:fld>
             <a:endParaRPr lang="en-US" dirty="0"/>
           </a:p>
@@ -3285,7 +3703,7 @@
           <a:p>
             <a:fld id="{8452596F-08A7-4B70-989A-F2B1CF31E66B}" type="datetime1">
               <a:rPr lang="en-US" smtClean="0"/>
-              <a:t>4/16/2024</a:t>
+              <a:t>4/17/2024</a:t>
             </a:fld>
             <a:endParaRPr lang="en-US" dirty="0"/>
           </a:p>
@@ -3455,7 +3873,7 @@
           <a:p>
             <a:fld id="{73C55A3C-5767-4844-A0A3-83778C2E5409}" type="datetime1">
               <a:rPr lang="en-US" smtClean="0"/>
-              <a:t>4/16/2024</a:t>
+              <a:t>4/17/2024</a:t>
             </a:fld>
             <a:endParaRPr lang="en-US" dirty="0"/>
           </a:p>
@@ -3699,7 +4117,7 @@
           <a:p>
             <a:fld id="{CAE507A8-A5CF-4D38-AB86-7EDDA87A85D4}" type="datetime1">
               <a:rPr lang="en-US" smtClean="0"/>
-              <a:t>4/16/2024</a:t>
+              <a:t>4/17/2024</a:t>
             </a:fld>
             <a:endParaRPr lang="en-US" dirty="0"/>
           </a:p>
@@ -3941,7 +4359,7 @@
           <a:p>
             <a:fld id="{BDFCD27C-8599-43EF-BA1D-14DDC1946E06}" type="datetime1">
               <a:rPr lang="en-US" smtClean="0"/>
-              <a:t>4/16/2024</a:t>
+              <a:t>4/17/2024</a:t>
             </a:fld>
             <a:endParaRPr lang="en-US" dirty="0"/>
           </a:p>
@@ -4424,7 +4842,7 @@
           <a:p>
             <a:fld id="{49343D99-809A-49C0-96E5-4250D0B498EE}" type="datetime1">
               <a:rPr lang="en-US" smtClean="0"/>
-              <a:t>4/16/2024</a:t>
+              <a:t>4/17/2024</a:t>
             </a:fld>
             <a:endParaRPr lang="en-US" dirty="0"/>
           </a:p>
@@ -4542,7 +4960,7 @@
           <a:p>
             <a:fld id="{A143DE9B-B678-4EFB-BB7D-A4370204A0B0}" type="datetime1">
               <a:rPr lang="en-US" smtClean="0"/>
-              <a:t>4/16/2024</a:t>
+              <a:t>4/17/2024</a:t>
             </a:fld>
             <a:endParaRPr lang="en-US" dirty="0"/>
           </a:p>
@@ -4637,7 +5055,7 @@
           <a:p>
             <a:fld id="{E68812DA-F765-4142-A6A3-A8ED7235E082}" type="datetime1">
               <a:rPr lang="en-US" smtClean="0"/>
-              <a:t>4/16/2024</a:t>
+              <a:t>4/17/2024</a:t>
             </a:fld>
             <a:endParaRPr lang="en-US" dirty="0"/>
           </a:p>
@@ -4892,7 +5310,7 @@
           <a:p>
             <a:fld id="{3E0277FD-7DE6-41D4-930D-AC99F5AFE54E}" type="datetime1">
               <a:rPr lang="en-US" smtClean="0"/>
-              <a:t>4/16/2024</a:t>
+              <a:t>4/17/2024</a:t>
             </a:fld>
             <a:endParaRPr lang="en-US" dirty="0"/>
           </a:p>
@@ -5199,7 +5617,7 @@
           <a:p>
             <a:fld id="{9EA15526-7079-4B7B-987C-1B5FAE11A0FF}" type="datetime1">
               <a:rPr lang="en-US" smtClean="0"/>
-              <a:t>4/16/2024</a:t>
+              <a:t>4/17/2024</a:t>
             </a:fld>
             <a:endParaRPr lang="en-US" dirty="0"/>
           </a:p>
@@ -5434,7 +5852,7 @@
           <a:p>
             <a:fld id="{073ED0CC-082F-4160-86E5-0D6041F12778}" type="datetime1">
               <a:rPr lang="en-US" smtClean="0"/>
-              <a:t>4/16/2024</a:t>
+              <a:t>4/17/2024</a:t>
             </a:fld>
             <a:endParaRPr lang="en-US" dirty="0"/>
           </a:p>
@@ -6329,6 +6747,140 @@
           <p:cNvPr id="2" name="Title 1">
             <a:extLst>
               <a:ext uri="{FF2B5EF4-FFF2-40B4-BE49-F238E27FC236}">
+                <a16:creationId xmlns:a16="http://schemas.microsoft.com/office/drawing/2014/main" id="{16635E81-7C42-016D-24B9-C03FF7C9118A}"/>
+              </a:ext>
+            </a:extLst>
+          </p:cNvPr>
+          <p:cNvSpPr>
+            <a:spLocks noGrp="1"/>
+          </p:cNvSpPr>
+          <p:nvPr>
+            <p:ph type="title"/>
+          </p:nvPr>
+        </p:nvSpPr>
+        <p:spPr>
+          <a:xfrm>
+            <a:off x="913806" y="4565255"/>
+            <a:ext cx="10355326" cy="543472"/>
+          </a:xfrm>
+        </p:spPr>
+        <p:txBody>
+          <a:bodyPr anchor="b">
+            <a:normAutofit/>
+          </a:bodyPr>
+          <a:lstStyle/>
+          <a:p>
+            <a:r>
+              <a:rPr lang="en-US" dirty="0"/>
+              <a:t>Top 5 Countries of Production</a:t>
+            </a:r>
+          </a:p>
+        </p:txBody>
+      </p:sp>
+      <p:pic>
+        <p:nvPicPr>
+          <p:cNvPr id="10" name="Content Placeholder 9" descr="A pie chart with different colored circles&#10;&#10;Description automatically generated">
+            <a:extLst>
+              <a:ext uri="{FF2B5EF4-FFF2-40B4-BE49-F238E27FC236}">
+                <a16:creationId xmlns:a16="http://schemas.microsoft.com/office/drawing/2014/main" id="{9C0D097C-B5D0-2B3D-6250-491558FFB147}"/>
+              </a:ext>
+            </a:extLst>
+          </p:cNvPr>
+          <p:cNvPicPr>
+            <a:picLocks noGrp="1" noChangeAspect="1"/>
+          </p:cNvPicPr>
+          <p:nvPr>
+            <p:ph type="pic" idx="1"/>
+          </p:nvPr>
+        </p:nvPicPr>
+        <p:blipFill>
+          <a:blip r:embed="rId2">
+            <a:extLst>
+              <a:ext uri="{28A0092B-C50C-407E-A947-70E740481C1C}">
+                <a14:useLocalDpi xmlns:a14="http://schemas.microsoft.com/office/drawing/2010/main" val="0"/>
+              </a:ext>
+            </a:extLst>
+          </a:blip>
+          <a:stretch/>
+        </p:blipFill>
+        <p:spPr>
+          <a:xfrm>
+            <a:off x="4769895" y="695009"/>
+            <a:ext cx="2644253" cy="3525671"/>
+          </a:xfrm>
+          <a:noFill/>
+        </p:spPr>
+      </p:pic>
+      <p:sp>
+        <p:nvSpPr>
+          <p:cNvPr id="15" name="Content Placeholder 3">
+            <a:extLst>
+              <a:ext uri="{FF2B5EF4-FFF2-40B4-BE49-F238E27FC236}">
+                <a16:creationId xmlns:a16="http://schemas.microsoft.com/office/drawing/2014/main" id="{060921CC-50CD-793A-0E10-673D1F89DA51}"/>
+              </a:ext>
+            </a:extLst>
+          </p:cNvPr>
+          <p:cNvSpPr>
+            <a:spLocks noGrp="1"/>
+          </p:cNvSpPr>
+          <p:nvPr>
+            <p:ph type="body" sz="half" idx="2"/>
+          </p:nvPr>
+        </p:nvSpPr>
+        <p:spPr>
+          <a:xfrm>
+            <a:off x="913795" y="5247728"/>
+            <a:ext cx="10353762" cy="543472"/>
+          </a:xfrm>
+        </p:spPr>
+        <p:txBody>
+          <a:bodyPr anchor="t">
+            <a:normAutofit/>
+          </a:bodyPr>
+          <a:lstStyle/>
+          <a:p>
+            <a:r>
+              <a:rPr lang="en-US" dirty="0"/>
+              <a:t>Brazil creating almost 50 %  of the top 5 countries combined</a:t>
+            </a:r>
+          </a:p>
+        </p:txBody>
+      </p:sp>
+    </p:spTree>
+    <p:extLst>
+      <p:ext uri="{BB962C8B-B14F-4D97-AF65-F5344CB8AC3E}">
+        <p14:creationId xmlns:p14="http://schemas.microsoft.com/office/powerpoint/2010/main" val="1978639848"/>
+      </p:ext>
+    </p:extLst>
+  </p:cSld>
+  <p:clrMapOvr>
+    <a:masterClrMapping/>
+  </p:clrMapOvr>
+</p:sld>
+</file>
+
+<file path=ppt/slides/slide11.xml><?xml version="1.0" encoding="utf-8"?>
+<p:sld xmlns:a="http://schemas.openxmlformats.org/drawingml/2006/main" xmlns:r="http://schemas.openxmlformats.org/officeDocument/2006/relationships" xmlns:p="http://schemas.openxmlformats.org/presentationml/2006/main">
+  <p:cSld>
+    <p:spTree>
+      <p:nvGrpSpPr>
+        <p:cNvPr id="1" name=""/>
+        <p:cNvGrpSpPr/>
+        <p:nvPr/>
+      </p:nvGrpSpPr>
+      <p:grpSpPr>
+        <a:xfrm>
+          <a:off x="0" y="0"/>
+          <a:ext cx="0" cy="0"/>
+          <a:chOff x="0" y="0"/>
+          <a:chExt cx="0" cy="0"/>
+        </a:xfrm>
+      </p:grpSpPr>
+      <p:sp>
+        <p:nvSpPr>
+          <p:cNvPr id="2" name="Title 1">
+            <a:extLst>
+              <a:ext uri="{FF2B5EF4-FFF2-40B4-BE49-F238E27FC236}">
                 <a16:creationId xmlns:a16="http://schemas.microsoft.com/office/drawing/2014/main" id="{4E50B996-81AE-4E75-1F3D-1FBFBC318B4A}"/>
               </a:ext>
             </a:extLst>
@@ -6342,55 +6894,32 @@
         </p:nvSpPr>
         <p:spPr>
           <a:xfrm>
-            <a:off x="850185" y="92765"/>
-            <a:ext cx="10353762" cy="1257300"/>
-          </a:xfrm>
-        </p:spPr>
-        <p:txBody>
-          <a:bodyPr>
+            <a:off x="913806" y="4565255"/>
+            <a:ext cx="10355326" cy="543472"/>
+          </a:xfrm>
+        </p:spPr>
+        <p:txBody>
+          <a:bodyPr vert="horz" lIns="91440" tIns="45720" rIns="91440" bIns="45720" rtlCol="0" anchor="b">
             <a:normAutofit/>
           </a:bodyPr>
           <a:lstStyle/>
           <a:p>
             <a:r>
-              <a:rPr lang="en-US" sz="2400" dirty="0"/>
-              <a:t>Mitch section space holder</a:t>
-            </a:r>
-          </a:p>
-        </p:txBody>
-      </p:sp>
-      <p:sp>
-        <p:nvSpPr>
-          <p:cNvPr id="5" name="TextBox 4">
-            <a:extLst>
-              <a:ext uri="{FF2B5EF4-FFF2-40B4-BE49-F238E27FC236}">
-                <a16:creationId xmlns:a16="http://schemas.microsoft.com/office/drawing/2014/main" id="{D1E369A4-07E9-E30A-5237-6149C7EAC6BF}"/>
-              </a:ext>
-            </a:extLst>
-          </p:cNvPr>
-          <p:cNvSpPr txBox="1"/>
-          <p:nvPr/>
-        </p:nvSpPr>
-        <p:spPr>
-          <a:xfrm>
-            <a:off x="1025718" y="5701085"/>
-            <a:ext cx="10861482" cy="954107"/>
-          </a:xfrm>
-          <a:prstGeom prst="rect">
-            <a:avLst/>
-          </a:prstGeom>
-          <a:noFill/>
-        </p:spPr>
-        <p:txBody>
-          <a:bodyPr wrap="square" rtlCol="0">
-            <a:spAutoFit/>
-          </a:bodyPr>
-          <a:lstStyle/>
-          <a:p>
-            <a:r>
-              <a:rPr lang="en-US" sz="1400" dirty="0"/>
-              <a:t>Comments on Avg Annual Rainfall vs quality of coffee : Here, the null hypothesis is that coffee quality and avg rainfall among the coffee producing countries have nothing to do with one another. The p value turns out to be about 0.15, so we cannot reject this null hypothesis. Most coffee producing regions do get significant rainfall, but the variance within this group of coffee producing nations does not appear to significantly affect the quality of coffee produced. </a:t>
-            </a:r>
+              <a:rPr lang="en-US" dirty="0"/>
+              <a:t>Smallest Amount of Coffee Production</a:t>
+            </a:r>
+            <a:endParaRPr lang="en-US" kern="1200" dirty="0">
+              <a:effectLst>
+                <a:outerShdw blurRad="9525" dist="25400" dir="14640000" algn="tl" rotWithShape="0">
+                  <a:schemeClr val="bg1">
+                    <a:alpha val="30000"/>
+                  </a:schemeClr>
+                </a:outerShdw>
+              </a:effectLst>
+              <a:latin typeface="+mj-lt"/>
+              <a:ea typeface="+mj-ea"/>
+              <a:cs typeface="Trebuchet MS"/>
+            </a:endParaRPr>
           </a:p>
         </p:txBody>
       </p:sp>
@@ -6422,14 +6951,101 @@
         </p:blipFill>
         <p:spPr>
           <a:xfrm>
-            <a:off x="1523991" y="92765"/>
-            <a:ext cx="9144018" cy="5486411"/>
+            <a:off x="3153963" y="695009"/>
+            <a:ext cx="5876118" cy="3525671"/>
           </a:xfrm>
           <a:prstGeom prst="rect">
             <a:avLst/>
           </a:prstGeom>
+          <a:noFill/>
+          <a:effectLst>
+            <a:outerShdw blurRad="38100" dist="25400" dir="4440000">
+              <a:srgbClr val="000000">
+                <a:alpha val="36000"/>
+              </a:srgbClr>
+            </a:outerShdw>
+          </a:effectLst>
         </p:spPr>
       </p:pic>
+      <p:sp>
+        <p:nvSpPr>
+          <p:cNvPr id="5" name="TextBox 4">
+            <a:extLst>
+              <a:ext uri="{FF2B5EF4-FFF2-40B4-BE49-F238E27FC236}">
+                <a16:creationId xmlns:a16="http://schemas.microsoft.com/office/drawing/2014/main" id="{D1E369A4-07E9-E30A-5237-6149C7EAC6BF}"/>
+              </a:ext>
+            </a:extLst>
+          </p:cNvPr>
+          <p:cNvSpPr txBox="1"/>
+          <p:nvPr/>
+        </p:nvSpPr>
+        <p:spPr>
+          <a:xfrm>
+            <a:off x="913795" y="5247728"/>
+            <a:ext cx="10353762" cy="543472"/>
+          </a:xfrm>
+          <a:prstGeom prst="rect">
+            <a:avLst/>
+          </a:prstGeom>
+          <a:effectLst>
+            <a:outerShdw blurRad="25400" dir="17880000">
+              <a:srgbClr val="000000">
+                <a:alpha val="46000"/>
+              </a:srgbClr>
+            </a:outerShdw>
+          </a:effectLst>
+        </p:spPr>
+        <p:txBody>
+          <a:bodyPr vert="horz" lIns="91440" tIns="45720" rIns="91440" bIns="45720" rtlCol="0" anchor="t">
+            <a:normAutofit/>
+          </a:bodyPr>
+          <a:lstStyle/>
+          <a:p>
+            <a:pPr algn="ctr" defTabSz="457200">
+              <a:lnSpc>
+                <a:spcPct val="110000"/>
+              </a:lnSpc>
+              <a:spcBef>
+                <a:spcPct val="20000"/>
+              </a:spcBef>
+              <a:spcAft>
+                <a:spcPts val="600"/>
+              </a:spcAft>
+              <a:buClr>
+                <a:schemeClr val="tx2"/>
+              </a:buClr>
+              <a:buSzPct val="70000"/>
+            </a:pPr>
+            <a:r>
+              <a:rPr lang="en-US" sz="1600" kern="1200">
+                <a:ln>
+                  <a:solidFill>
+                    <a:schemeClr val="bg1">
+                      <a:lumMod val="75000"/>
+                      <a:lumOff val="25000"/>
+                      <a:alpha val="10000"/>
+                    </a:schemeClr>
+                  </a:solidFill>
+                </a:ln>
+                <a:solidFill>
+                  <a:schemeClr val="tx2"/>
+                </a:solidFill>
+                <a:effectLst>
+                  <a:outerShdw blurRad="9525" dist="25400" dir="14640000" algn="tl" rotWithShape="0">
+                    <a:schemeClr val="bg1">
+                      <a:alpha val="30000"/>
+                    </a:schemeClr>
+                  </a:outerShdw>
+                </a:effectLst>
+                <a:latin typeface="+mn-lt"/>
+                <a:ea typeface="+mn-ea"/>
+                <a:cs typeface="+mn-cs"/>
+              </a:rPr>
+              <a:t>Benin coming in last place of production making coffee coming from that country extremely rare</a:t>
+            </a:r>
+          </a:p>
+        </p:txBody>
+      </p:sp>
     </p:spTree>
     <p:extLst>
       <p:ext uri="{BB962C8B-B14F-4D97-AF65-F5344CB8AC3E}">
@@ -6443,7 +7059,7 @@
 </p:sld>
 </file>
 
-<file path=ppt/slides/slide11.xml><?xml version="1.0" encoding="utf-8"?>
+<file path=ppt/slides/slide12.xml><?xml version="1.0" encoding="utf-8"?>
 <p:sld xmlns:a="http://schemas.openxmlformats.org/drawingml/2006/main" xmlns:r="http://schemas.openxmlformats.org/officeDocument/2006/relationships" xmlns:p="http://schemas.openxmlformats.org/presentationml/2006/main">
   <p:cSld>
     <p:spTree>
@@ -6478,54 +7094,30 @@
         </p:nvSpPr>
         <p:spPr>
           <a:xfrm>
-            <a:off x="850185" y="92765"/>
-            <a:ext cx="10353762" cy="1257300"/>
-          </a:xfrm>
-        </p:spPr>
-        <p:txBody>
-          <a:bodyPr>
+            <a:off x="913806" y="4565255"/>
+            <a:ext cx="10355326" cy="543472"/>
+          </a:xfrm>
+        </p:spPr>
+        <p:txBody>
+          <a:bodyPr vert="horz" lIns="91440" tIns="45720" rIns="91440" bIns="45720" rtlCol="0" anchor="b">
             <a:normAutofit/>
           </a:bodyPr>
           <a:lstStyle/>
           <a:p>
             <a:r>
-              <a:rPr lang="en-US" sz="2400" dirty="0"/>
-              <a:t>Mitch section space holder</a:t>
-            </a:r>
-          </a:p>
-        </p:txBody>
-      </p:sp>
-      <p:sp>
-        <p:nvSpPr>
-          <p:cNvPr id="5" name="TextBox 4">
-            <a:extLst>
-              <a:ext uri="{FF2B5EF4-FFF2-40B4-BE49-F238E27FC236}">
-                <a16:creationId xmlns:a16="http://schemas.microsoft.com/office/drawing/2014/main" id="{D1E369A4-07E9-E30A-5237-6149C7EAC6BF}"/>
-              </a:ext>
-            </a:extLst>
-          </p:cNvPr>
-          <p:cNvSpPr txBox="1"/>
-          <p:nvPr/>
-        </p:nvSpPr>
-        <p:spPr>
-          <a:xfrm>
-            <a:off x="1025718" y="5701085"/>
-            <a:ext cx="10861482" cy="954107"/>
-          </a:xfrm>
-          <a:prstGeom prst="rect">
-            <a:avLst/>
-          </a:prstGeom>
-          <a:noFill/>
-        </p:spPr>
-        <p:txBody>
-          <a:bodyPr wrap="square" rtlCol="0">
-            <a:spAutoFit/>
-          </a:bodyPr>
-          <a:lstStyle/>
-          <a:p>
-            <a:r>
-              <a:rPr lang="en-US" sz="1400" dirty="0"/>
-              <a:t>Comments on Avg Annual Rainfall vs quality of coffee : Here, the null hypothesis is that coffee quality and avg rainfall among the coffee producing countries have nothing to do with one another. The p value turns out to be about 0.15, so we cannot reject this null hypothesis. Most coffee producing regions do get significant rainfall, but the variance within this group of coffee producing nations does not appear to significantly affect the quality of coffee produced. </a:t>
+              <a:rPr lang="en-US" kern="1200" dirty="0">
+                <a:effectLst>
+                  <a:outerShdw blurRad="9525" dist="25400" dir="14640000" algn="tl" rotWithShape="0">
+                    <a:schemeClr val="bg1">
+                      <a:alpha val="30000"/>
+                    </a:schemeClr>
+                  </a:outerShdw>
+                </a:effectLst>
+                <a:latin typeface="+mj-lt"/>
+                <a:ea typeface="+mj-ea"/>
+                <a:cs typeface="Trebuchet MS"/>
+              </a:rPr>
+              <a:t>Brazil Yearly Production</a:t>
             </a:r>
           </a:p>
         </p:txBody>
@@ -6558,14 +7150,101 @@
         </p:blipFill>
         <p:spPr>
           <a:xfrm>
-            <a:off x="1379135" y="92765"/>
-            <a:ext cx="9144018" cy="5486411"/>
+            <a:off x="3153963" y="695009"/>
+            <a:ext cx="5876118" cy="3525671"/>
           </a:xfrm>
           <a:prstGeom prst="rect">
             <a:avLst/>
           </a:prstGeom>
+          <a:noFill/>
+          <a:effectLst>
+            <a:outerShdw blurRad="38100" dist="25400" dir="4440000">
+              <a:srgbClr val="000000">
+                <a:alpha val="36000"/>
+              </a:srgbClr>
+            </a:outerShdw>
+          </a:effectLst>
         </p:spPr>
       </p:pic>
+      <p:sp>
+        <p:nvSpPr>
+          <p:cNvPr id="5" name="TextBox 4">
+            <a:extLst>
+              <a:ext uri="{FF2B5EF4-FFF2-40B4-BE49-F238E27FC236}">
+                <a16:creationId xmlns:a16="http://schemas.microsoft.com/office/drawing/2014/main" id="{D1E369A4-07E9-E30A-5237-6149C7EAC6BF}"/>
+              </a:ext>
+            </a:extLst>
+          </p:cNvPr>
+          <p:cNvSpPr txBox="1"/>
+          <p:nvPr/>
+        </p:nvSpPr>
+        <p:spPr>
+          <a:xfrm>
+            <a:off x="913795" y="5247728"/>
+            <a:ext cx="10353762" cy="543472"/>
+          </a:xfrm>
+          <a:prstGeom prst="rect">
+            <a:avLst/>
+          </a:prstGeom>
+          <a:effectLst>
+            <a:outerShdw blurRad="25400" dir="17880000">
+              <a:srgbClr val="000000">
+                <a:alpha val="46000"/>
+              </a:srgbClr>
+            </a:outerShdw>
+          </a:effectLst>
+        </p:spPr>
+        <p:txBody>
+          <a:bodyPr vert="horz" lIns="91440" tIns="45720" rIns="91440" bIns="45720" rtlCol="0" anchor="t">
+            <a:normAutofit/>
+          </a:bodyPr>
+          <a:lstStyle/>
+          <a:p>
+            <a:pPr algn="ctr" defTabSz="457200">
+              <a:lnSpc>
+                <a:spcPct val="110000"/>
+              </a:lnSpc>
+              <a:spcBef>
+                <a:spcPct val="20000"/>
+              </a:spcBef>
+              <a:spcAft>
+                <a:spcPts val="600"/>
+              </a:spcAft>
+              <a:buClr>
+                <a:schemeClr val="tx2"/>
+              </a:buClr>
+              <a:buSzPct val="70000"/>
+            </a:pPr>
+            <a:r>
+              <a:rPr lang="en-US" sz="1600" kern="1200" dirty="0">
+                <a:ln>
+                  <a:solidFill>
+                    <a:schemeClr val="bg1">
+                      <a:lumMod val="75000"/>
+                      <a:lumOff val="25000"/>
+                      <a:alpha val="10000"/>
+                    </a:schemeClr>
+                  </a:solidFill>
+                </a:ln>
+                <a:solidFill>
+                  <a:schemeClr val="tx2"/>
+                </a:solidFill>
+                <a:effectLst>
+                  <a:outerShdw blurRad="9525" dist="25400" dir="14640000" algn="tl" rotWithShape="0">
+                    <a:schemeClr val="bg1">
+                      <a:alpha val="30000"/>
+                    </a:schemeClr>
+                  </a:outerShdw>
+                </a:effectLst>
+                <a:latin typeface="+mn-lt"/>
+                <a:ea typeface="+mn-ea"/>
+                <a:cs typeface="+mn-cs"/>
+              </a:rPr>
+              <a:t>The of the amount of coffee Brazil has produced since 1990 with a staggering upwards trend </a:t>
+            </a:r>
+          </a:p>
+        </p:txBody>
+      </p:sp>
     </p:spTree>
     <p:extLst>
       <p:ext uri="{BB962C8B-B14F-4D97-AF65-F5344CB8AC3E}">
@@ -6579,7 +7258,340 @@
 </p:sld>
 </file>
 
-<file path=ppt/slides/slide12.xml><?xml version="1.0" encoding="utf-8"?>
+<file path=ppt/slides/slide13.xml><?xml version="1.0" encoding="utf-8"?>
+<p:sld xmlns:a="http://schemas.openxmlformats.org/drawingml/2006/main" xmlns:r="http://schemas.openxmlformats.org/officeDocument/2006/relationships" xmlns:p="http://schemas.openxmlformats.org/presentationml/2006/main">
+  <p:cSld>
+    <p:spTree>
+      <p:nvGrpSpPr>
+        <p:cNvPr id="1" name=""/>
+        <p:cNvGrpSpPr/>
+        <p:nvPr/>
+      </p:nvGrpSpPr>
+      <p:grpSpPr>
+        <a:xfrm>
+          <a:off x="0" y="0"/>
+          <a:ext cx="0" cy="0"/>
+          <a:chOff x="0" y="0"/>
+          <a:chExt cx="0" cy="0"/>
+        </a:xfrm>
+      </p:grpSpPr>
+      <p:sp>
+        <p:nvSpPr>
+          <p:cNvPr id="18" name="Title 1">
+            <a:extLst>
+              <a:ext uri="{FF2B5EF4-FFF2-40B4-BE49-F238E27FC236}">
+                <a16:creationId xmlns:a16="http://schemas.microsoft.com/office/drawing/2014/main" id="{A8B65ABF-AF7F-4AFC-B7FB-63EE492E2948}"/>
+              </a:ext>
+            </a:extLst>
+          </p:cNvPr>
+          <p:cNvSpPr>
+            <a:spLocks noGrp="1"/>
+          </p:cNvSpPr>
+          <p:nvPr>
+            <p:ph type="title"/>
+          </p:nvPr>
+        </p:nvSpPr>
+        <p:spPr>
+          <a:xfrm>
+            <a:off x="913806" y="4565255"/>
+            <a:ext cx="10355326" cy="543472"/>
+          </a:xfrm>
+        </p:spPr>
+        <p:txBody>
+          <a:bodyPr/>
+          <a:lstStyle/>
+          <a:p>
+            <a:r>
+              <a:rPr lang="en-US" dirty="0"/>
+              <a:t>Benin Yearly Production</a:t>
+            </a:r>
+          </a:p>
+        </p:txBody>
+      </p:sp>
+      <p:pic>
+        <p:nvPicPr>
+          <p:cNvPr id="6" name="Picture Placeholder 5" descr="A graph with numbers and a bar&#10;&#10;Description automatically generated">
+            <a:extLst>
+              <a:ext uri="{FF2B5EF4-FFF2-40B4-BE49-F238E27FC236}">
+                <a16:creationId xmlns:a16="http://schemas.microsoft.com/office/drawing/2014/main" id="{091DA132-6F4E-FFB9-6C33-99FDDE631735}"/>
+              </a:ext>
+            </a:extLst>
+          </p:cNvPr>
+          <p:cNvPicPr>
+            <a:picLocks noGrp="1" noChangeAspect="1"/>
+          </p:cNvPicPr>
+          <p:nvPr>
+            <p:ph type="pic" idx="1"/>
+          </p:nvPr>
+        </p:nvPicPr>
+        <p:blipFill>
+          <a:blip r:embed="rId2">
+            <a:extLst>
+              <a:ext uri="{28A0092B-C50C-407E-A947-70E740481C1C}">
+                <a14:useLocalDpi xmlns:a14="http://schemas.microsoft.com/office/drawing/2010/main" val="0"/>
+              </a:ext>
+            </a:extLst>
+          </a:blip>
+          <a:stretch/>
+        </p:blipFill>
+        <p:spPr>
+          <a:xfrm>
+            <a:off x="3153963" y="695009"/>
+            <a:ext cx="5876118" cy="3525671"/>
+          </a:xfrm>
+          <a:noFill/>
+        </p:spPr>
+      </p:pic>
+      <p:sp>
+        <p:nvSpPr>
+          <p:cNvPr id="20" name="Text Placeholder 3">
+            <a:extLst>
+              <a:ext uri="{FF2B5EF4-FFF2-40B4-BE49-F238E27FC236}">
+                <a16:creationId xmlns:a16="http://schemas.microsoft.com/office/drawing/2014/main" id="{DD5BE557-09E1-FF46-6AF2-8D2A3CDEECAF}"/>
+              </a:ext>
+            </a:extLst>
+          </p:cNvPr>
+          <p:cNvSpPr>
+            <a:spLocks noGrp="1"/>
+          </p:cNvSpPr>
+          <p:nvPr>
+            <p:ph type="body" sz="half" idx="2"/>
+          </p:nvPr>
+        </p:nvSpPr>
+        <p:spPr>
+          <a:xfrm>
+            <a:off x="913795" y="5247728"/>
+            <a:ext cx="10353762" cy="543472"/>
+          </a:xfrm>
+        </p:spPr>
+        <p:txBody>
+          <a:bodyPr/>
+          <a:lstStyle/>
+          <a:p>
+            <a:r>
+              <a:rPr lang="en-US" dirty="0"/>
+              <a:t>Showing Benin producing for only a single year in comparison.</a:t>
+            </a:r>
+          </a:p>
+          <a:p>
+            <a:endParaRPr lang="en-US" dirty="0"/>
+          </a:p>
+        </p:txBody>
+      </p:sp>
+    </p:spTree>
+    <p:extLst>
+      <p:ext uri="{BB962C8B-B14F-4D97-AF65-F5344CB8AC3E}">
+        <p14:creationId xmlns:p14="http://schemas.microsoft.com/office/powerpoint/2010/main" val="3215587714"/>
+      </p:ext>
+    </p:extLst>
+  </p:cSld>
+  <p:clrMapOvr>
+    <a:masterClrMapping/>
+  </p:clrMapOvr>
+</p:sld>
+</file>
+
+<file path=ppt/slides/slide14.xml><?xml version="1.0" encoding="utf-8"?>
+<p:sld xmlns:a="http://schemas.openxmlformats.org/drawingml/2006/main" xmlns:r="http://schemas.openxmlformats.org/officeDocument/2006/relationships" xmlns:p="http://schemas.openxmlformats.org/presentationml/2006/main">
+  <p:cSld>
+    <p:spTree>
+      <p:nvGrpSpPr>
+        <p:cNvPr id="1" name=""/>
+        <p:cNvGrpSpPr/>
+        <p:nvPr/>
+      </p:nvGrpSpPr>
+      <p:grpSpPr>
+        <a:xfrm>
+          <a:off x="0" y="0"/>
+          <a:ext cx="0" cy="0"/>
+          <a:chOff x="0" y="0"/>
+          <a:chExt cx="0" cy="0"/>
+        </a:xfrm>
+      </p:grpSpPr>
+      <p:sp>
+        <p:nvSpPr>
+          <p:cNvPr id="13" name="Title 1">
+            <a:extLst>
+              <a:ext uri="{FF2B5EF4-FFF2-40B4-BE49-F238E27FC236}">
+                <a16:creationId xmlns:a16="http://schemas.microsoft.com/office/drawing/2014/main" id="{F7C0F441-74BB-4A51-F58B-BC1702343F57}"/>
+              </a:ext>
+            </a:extLst>
+          </p:cNvPr>
+          <p:cNvSpPr>
+            <a:spLocks noGrp="1"/>
+          </p:cNvSpPr>
+          <p:nvPr>
+            <p:ph type="title"/>
+          </p:nvPr>
+        </p:nvSpPr>
+        <p:spPr>
+          <a:xfrm>
+            <a:off x="913795" y="609600"/>
+            <a:ext cx="10353762" cy="970450"/>
+          </a:xfrm>
+        </p:spPr>
+        <p:txBody>
+          <a:bodyPr/>
+          <a:lstStyle/>
+          <a:p>
+            <a:r>
+              <a:rPr lang="en-US" dirty="0"/>
+              <a:t>Production Comparison </a:t>
+            </a:r>
+          </a:p>
+        </p:txBody>
+      </p:sp>
+      <p:sp>
+        <p:nvSpPr>
+          <p:cNvPr id="15" name="Text Placeholder 2">
+            <a:extLst>
+              <a:ext uri="{FF2B5EF4-FFF2-40B4-BE49-F238E27FC236}">
+                <a16:creationId xmlns:a16="http://schemas.microsoft.com/office/drawing/2014/main" id="{33CD28B0-C927-1D0B-E093-F1FF2FB7CB7A}"/>
+              </a:ext>
+            </a:extLst>
+          </p:cNvPr>
+          <p:cNvSpPr>
+            <a:spLocks noGrp="1"/>
+          </p:cNvSpPr>
+          <p:nvPr>
+            <p:ph type="body" idx="1"/>
+          </p:nvPr>
+        </p:nvSpPr>
+        <p:spPr>
+          <a:xfrm>
+            <a:off x="1046013" y="1855153"/>
+            <a:ext cx="4764764" cy="692494"/>
+          </a:xfrm>
+        </p:spPr>
+        <p:txBody>
+          <a:bodyPr/>
+          <a:lstStyle/>
+          <a:p>
+            <a:r>
+              <a:rPr lang="en-US" dirty="0"/>
+              <a:t>Benin</a:t>
+            </a:r>
+          </a:p>
+        </p:txBody>
+      </p:sp>
+      <p:pic>
+        <p:nvPicPr>
+          <p:cNvPr id="6" name="Picture Placeholder 5" descr="A graph with numbers and a bar&#10;&#10;Description automatically generated">
+            <a:extLst>
+              <a:ext uri="{FF2B5EF4-FFF2-40B4-BE49-F238E27FC236}">
+                <a16:creationId xmlns:a16="http://schemas.microsoft.com/office/drawing/2014/main" id="{E4F9775A-DF1E-75C2-46FB-C0520B94B880}"/>
+              </a:ext>
+            </a:extLst>
+          </p:cNvPr>
+          <p:cNvPicPr>
+            <a:picLocks noGrp="1" noChangeAspect="1"/>
+          </p:cNvPicPr>
+          <p:nvPr>
+            <p:ph sz="half" idx="2"/>
+          </p:nvPr>
+        </p:nvPicPr>
+        <p:blipFill rotWithShape="1">
+          <a:blip r:embed="rId2">
+            <a:extLst>
+              <a:ext uri="{28A0092B-C50C-407E-A947-70E740481C1C}">
+                <a14:useLocalDpi xmlns:a14="http://schemas.microsoft.com/office/drawing/2010/main" val="0"/>
+              </a:ext>
+            </a:extLst>
+          </a:blip>
+          <a:srcRect l="3034" r="3031" b="-3"/>
+          <a:stretch/>
+        </p:blipFill>
+        <p:spPr>
+          <a:xfrm>
+            <a:off x="1046013" y="2702103"/>
+            <a:ext cx="4764764" cy="3043533"/>
+          </a:xfrm>
+          <a:noFill/>
+        </p:spPr>
+      </p:pic>
+      <p:sp>
+        <p:nvSpPr>
+          <p:cNvPr id="17" name="Text Placeholder 4">
+            <a:extLst>
+              <a:ext uri="{FF2B5EF4-FFF2-40B4-BE49-F238E27FC236}">
+                <a16:creationId xmlns:a16="http://schemas.microsoft.com/office/drawing/2014/main" id="{B435B09D-DD80-FEC6-58C2-2AE2C752D245}"/>
+              </a:ext>
+            </a:extLst>
+          </p:cNvPr>
+          <p:cNvSpPr>
+            <a:spLocks noGrp="1"/>
+          </p:cNvSpPr>
+          <p:nvPr>
+            <p:ph type="body" sz="quarter" idx="3"/>
+          </p:nvPr>
+        </p:nvSpPr>
+        <p:spPr>
+          <a:xfrm>
+            <a:off x="6363166" y="1855152"/>
+            <a:ext cx="4779582" cy="692495"/>
+          </a:xfrm>
+        </p:spPr>
+        <p:txBody>
+          <a:bodyPr/>
+          <a:lstStyle/>
+          <a:p>
+            <a:r>
+              <a:rPr lang="en-US" dirty="0"/>
+              <a:t>Brazil</a:t>
+            </a:r>
+          </a:p>
+        </p:txBody>
+      </p:sp>
+      <p:pic>
+        <p:nvPicPr>
+          <p:cNvPr id="8" name="Picture 7" descr="A graph of blue lines&#10;&#10;Description automatically generated with medium confidence">
+            <a:extLst>
+              <a:ext uri="{FF2B5EF4-FFF2-40B4-BE49-F238E27FC236}">
+                <a16:creationId xmlns:a16="http://schemas.microsoft.com/office/drawing/2014/main" id="{9EA27A98-CD77-5B66-0AA3-DE9A55ABEBD6}"/>
+              </a:ext>
+            </a:extLst>
+          </p:cNvPr>
+          <p:cNvPicPr>
+            <a:picLocks noChangeAspect="1"/>
+          </p:cNvPicPr>
+          <p:nvPr/>
+        </p:nvPicPr>
+        <p:blipFill rotWithShape="1">
+          <a:blip r:embed="rId3">
+            <a:extLst>
+              <a:ext uri="{28A0092B-C50C-407E-A947-70E740481C1C}">
+                <a14:useLocalDpi xmlns:a14="http://schemas.microsoft.com/office/drawing/2010/main" val="0"/>
+              </a:ext>
+            </a:extLst>
+          </a:blip>
+          <a:srcRect l="5776" r="-3" b="-3"/>
+          <a:stretch/>
+        </p:blipFill>
+        <p:spPr>
+          <a:xfrm>
+            <a:off x="6363167" y="2702103"/>
+            <a:ext cx="4779581" cy="3043533"/>
+          </a:xfrm>
+          <a:prstGeom prst="rect">
+            <a:avLst/>
+          </a:prstGeom>
+          <a:noFill/>
+        </p:spPr>
+      </p:pic>
+    </p:spTree>
+    <p:extLst>
+      <p:ext uri="{BB962C8B-B14F-4D97-AF65-F5344CB8AC3E}">
+        <p14:creationId xmlns:p14="http://schemas.microsoft.com/office/powerpoint/2010/main" val="1536241654"/>
+      </p:ext>
+    </p:extLst>
+  </p:cSld>
+  <p:clrMapOvr>
+    <a:masterClrMapping/>
+  </p:clrMapOvr>
+</p:sld>
+</file>
+
+<file path=ppt/slides/slide15.xml><?xml version="1.0" encoding="utf-8"?>
 <p:sld xmlns:a="http://schemas.openxmlformats.org/drawingml/2006/main" xmlns:r="http://schemas.openxmlformats.org/officeDocument/2006/relationships" xmlns:p="http://schemas.openxmlformats.org/presentationml/2006/main">
   <p:cSld>
     <p:spTree>
@@ -6732,7 +7744,7 @@
 </p:sld>
 </file>
 
-<file path=ppt/slides/slide13.xml><?xml version="1.0" encoding="utf-8"?>
+<file path=ppt/slides/slide16.xml><?xml version="1.0" encoding="utf-8"?>
 <p:sld xmlns:a="http://schemas.openxmlformats.org/drawingml/2006/main" xmlns:r="http://schemas.openxmlformats.org/officeDocument/2006/relationships" xmlns:p="http://schemas.openxmlformats.org/presentationml/2006/main">
   <p:cSld>
     <p:spTree>
@@ -6894,7 +7906,7 @@
 </p:sld>
 </file>
 
-<file path=ppt/slides/slide14.xml><?xml version="1.0" encoding="utf-8"?>
+<file path=ppt/slides/slide17.xml><?xml version="1.0" encoding="utf-8"?>
 <p:sld xmlns:a="http://schemas.openxmlformats.org/drawingml/2006/main" xmlns:r="http://schemas.openxmlformats.org/officeDocument/2006/relationships" xmlns:p="http://schemas.openxmlformats.org/presentationml/2006/main">
   <p:cSld>
     <p:spTree>
@@ -7041,7 +8053,7 @@
 </p:sld>
 </file>
 
-<file path=ppt/slides/slide15.xml><?xml version="1.0" encoding="utf-8"?>
+<file path=ppt/slides/slide18.xml><?xml version="1.0" encoding="utf-8"?>
 <p:sld xmlns:a="http://schemas.openxmlformats.org/drawingml/2006/main" xmlns:r="http://schemas.openxmlformats.org/officeDocument/2006/relationships" xmlns:p="http://schemas.openxmlformats.org/presentationml/2006/main">
   <p:cSld>
     <p:spTree>
@@ -7201,7 +8213,7 @@
 </p:sld>
 </file>
 
-<file path=ppt/slides/slide16.xml><?xml version="1.0" encoding="utf-8"?>
+<file path=ppt/slides/slide19.xml><?xml version="1.0" encoding="utf-8"?>
 <p:sld xmlns:a="http://schemas.openxmlformats.org/drawingml/2006/main" xmlns:r="http://schemas.openxmlformats.org/officeDocument/2006/relationships" xmlns:p="http://schemas.openxmlformats.org/presentationml/2006/main">
   <p:cSld>
     <p:spTree>
@@ -7352,292 +8364,6 @@
     <p:extLst>
       <p:ext uri="{BB962C8B-B14F-4D97-AF65-F5344CB8AC3E}">
         <p14:creationId xmlns:p14="http://schemas.microsoft.com/office/powerpoint/2010/main" val="312514768"/>
-      </p:ext>
-    </p:extLst>
-  </p:cSld>
-  <p:clrMapOvr>
-    <a:masterClrMapping/>
-  </p:clrMapOvr>
-</p:sld>
-</file>
-
-<file path=ppt/slides/slide17.xml><?xml version="1.0" encoding="utf-8"?>
-<p:sld xmlns:a="http://schemas.openxmlformats.org/drawingml/2006/main" xmlns:r="http://schemas.openxmlformats.org/officeDocument/2006/relationships" xmlns:p="http://schemas.openxmlformats.org/presentationml/2006/main">
-  <p:cSld>
-    <p:spTree>
-      <p:nvGrpSpPr>
-        <p:cNvPr id="1" name=""/>
-        <p:cNvGrpSpPr/>
-        <p:nvPr/>
-      </p:nvGrpSpPr>
-      <p:grpSpPr>
-        <a:xfrm>
-          <a:off x="0" y="0"/>
-          <a:ext cx="0" cy="0"/>
-          <a:chOff x="0" y="0"/>
-          <a:chExt cx="0" cy="0"/>
-        </a:xfrm>
-      </p:grpSpPr>
-      <p:sp>
-        <p:nvSpPr>
-          <p:cNvPr id="2" name="Title 1">
-            <a:extLst>
-              <a:ext uri="{FF2B5EF4-FFF2-40B4-BE49-F238E27FC236}">
-                <a16:creationId xmlns:a16="http://schemas.microsoft.com/office/drawing/2014/main" id="{4E50B996-81AE-4E75-1F3D-1FBFBC318B4A}"/>
-              </a:ext>
-            </a:extLst>
-          </p:cNvPr>
-          <p:cNvSpPr>
-            <a:spLocks noGrp="1"/>
-          </p:cNvSpPr>
-          <p:nvPr>
-            <p:ph type="title"/>
-          </p:nvPr>
-        </p:nvSpPr>
-        <p:spPr>
-          <a:xfrm>
-            <a:off x="850185" y="92765"/>
-            <a:ext cx="10353762" cy="1257300"/>
-          </a:xfrm>
-        </p:spPr>
-        <p:txBody>
-          <a:bodyPr>
-            <a:normAutofit/>
-          </a:bodyPr>
-          <a:lstStyle/>
-          <a:p>
-            <a:r>
-              <a:rPr lang="en-US" sz="1800" dirty="0">
-                <a:effectLst/>
-                <a:latin typeface="Aptos" panose="020B0004020202020204" pitchFamily="34" charset="0"/>
-                <a:ea typeface="Aptos" panose="020B0004020202020204" pitchFamily="34" charset="0"/>
-                <a:cs typeface="Times New Roman" panose="02020603050405020304" pitchFamily="18" charset="0"/>
-              </a:rPr>
-              <a:t>Answer to question: </a:t>
-            </a:r>
-            <a:br>
-              <a:rPr lang="en-US" sz="1800" dirty="0">
-                <a:effectLst/>
-                <a:latin typeface="Aptos" panose="020B0004020202020204" pitchFamily="34" charset="0"/>
-                <a:ea typeface="Aptos" panose="020B0004020202020204" pitchFamily="34" charset="0"/>
-                <a:cs typeface="Times New Roman" panose="02020603050405020304" pitchFamily="18" charset="0"/>
-              </a:rPr>
-            </a:br>
-            <a:r>
-              <a:rPr lang="en-US" sz="1800" dirty="0">
-                <a:effectLst/>
-                <a:latin typeface="Aptos" panose="020B0004020202020204" pitchFamily="34" charset="0"/>
-                <a:ea typeface="Aptos" panose="020B0004020202020204" pitchFamily="34" charset="0"/>
-                <a:cs typeface="Times New Roman" panose="02020603050405020304" pitchFamily="18" charset="0"/>
-              </a:rPr>
-              <a:t>What countries produce the most coffee and does that affect the quality of coffee produced?</a:t>
-            </a:r>
-            <a:endParaRPr lang="en-US" sz="2400" dirty="0"/>
-          </a:p>
-        </p:txBody>
-      </p:sp>
-      <p:sp>
-        <p:nvSpPr>
-          <p:cNvPr id="5" name="TextBox 4">
-            <a:extLst>
-              <a:ext uri="{FF2B5EF4-FFF2-40B4-BE49-F238E27FC236}">
-                <a16:creationId xmlns:a16="http://schemas.microsoft.com/office/drawing/2014/main" id="{D1E369A4-07E9-E30A-5237-6149C7EAC6BF}"/>
-              </a:ext>
-            </a:extLst>
-          </p:cNvPr>
-          <p:cNvSpPr txBox="1"/>
-          <p:nvPr/>
-        </p:nvSpPr>
-        <p:spPr>
-          <a:xfrm>
-            <a:off x="391886" y="2573383"/>
-            <a:ext cx="11234057" cy="1267655"/>
-          </a:xfrm>
-          <a:prstGeom prst="rect">
-            <a:avLst/>
-          </a:prstGeom>
-          <a:noFill/>
-        </p:spPr>
-        <p:txBody>
-          <a:bodyPr wrap="square" rtlCol="0">
-            <a:spAutoFit/>
-          </a:bodyPr>
-          <a:lstStyle/>
-          <a:p>
-            <a:pPr marL="342900" marR="0" lvl="0" indent="-342900">
-              <a:lnSpc>
-                <a:spcPct val="107000"/>
-              </a:lnSpc>
-              <a:spcBef>
-                <a:spcPts val="0"/>
-              </a:spcBef>
-              <a:spcAft>
-                <a:spcPts val="800"/>
-              </a:spcAft>
-              <a:buFont typeface="Aptos" panose="020B0004020202020204" pitchFamily="34" charset="0"/>
-              <a:buChar char="-"/>
-            </a:pPr>
-            <a:r>
-              <a:rPr lang="en-US" sz="1800" dirty="0">
-                <a:effectLst/>
-                <a:latin typeface="Aptos" panose="020B0004020202020204" pitchFamily="34" charset="0"/>
-                <a:ea typeface="Aptos" panose="020B0004020202020204" pitchFamily="34" charset="0"/>
-                <a:cs typeface="Times New Roman" panose="02020603050405020304" pitchFamily="18" charset="0"/>
-              </a:rPr>
-              <a:t>No, it does not. What countries produce the most coffee and does NOT impact the quality of coffee produced. All of the scores are so closely related it does not appear to influence the quality even where there is a lot more of production of coffee like Brazil, they are still neck and neck with Panama, Haiti, Malawi who have barely any production of coffee in comparison. </a:t>
-            </a:r>
-            <a:endParaRPr lang="en-US" sz="1800" kern="100" dirty="0">
-              <a:effectLst/>
-              <a:latin typeface="Aptos" panose="020B0004020202020204" pitchFamily="34" charset="0"/>
-              <a:ea typeface="Aptos" panose="020B0004020202020204" pitchFamily="34" charset="0"/>
-              <a:cs typeface="Times New Roman" panose="02020603050405020304" pitchFamily="18" charset="0"/>
-            </a:endParaRPr>
-          </a:p>
-        </p:txBody>
-      </p:sp>
-    </p:spTree>
-    <p:extLst>
-      <p:ext uri="{BB962C8B-B14F-4D97-AF65-F5344CB8AC3E}">
-        <p14:creationId xmlns:p14="http://schemas.microsoft.com/office/powerpoint/2010/main" val="1212262085"/>
-      </p:ext>
-    </p:extLst>
-  </p:cSld>
-  <p:clrMapOvr>
-    <a:masterClrMapping/>
-  </p:clrMapOvr>
-</p:sld>
-</file>
-
-<file path=ppt/slides/slide18.xml><?xml version="1.0" encoding="utf-8"?>
-<p:sld xmlns:a="http://schemas.openxmlformats.org/drawingml/2006/main" xmlns:r="http://schemas.openxmlformats.org/officeDocument/2006/relationships" xmlns:p="http://schemas.openxmlformats.org/presentationml/2006/main">
-  <p:cSld>
-    <p:spTree>
-      <p:nvGrpSpPr>
-        <p:cNvPr id="1" name=""/>
-        <p:cNvGrpSpPr/>
-        <p:nvPr/>
-      </p:nvGrpSpPr>
-      <p:grpSpPr>
-        <a:xfrm>
-          <a:off x="0" y="0"/>
-          <a:ext cx="0" cy="0"/>
-          <a:chOff x="0" y="0"/>
-          <a:chExt cx="0" cy="0"/>
-        </a:xfrm>
-      </p:grpSpPr>
-      <p:sp>
-        <p:nvSpPr>
-          <p:cNvPr id="2" name="Title 1">
-            <a:extLst>
-              <a:ext uri="{FF2B5EF4-FFF2-40B4-BE49-F238E27FC236}">
-                <a16:creationId xmlns:a16="http://schemas.microsoft.com/office/drawing/2014/main" id="{4E50B996-81AE-4E75-1F3D-1FBFBC318B4A}"/>
-              </a:ext>
-            </a:extLst>
-          </p:cNvPr>
-          <p:cNvSpPr>
-            <a:spLocks noGrp="1"/>
-          </p:cNvSpPr>
-          <p:nvPr>
-            <p:ph type="title"/>
-          </p:nvPr>
-        </p:nvSpPr>
-        <p:spPr>
-          <a:xfrm>
-            <a:off x="850185" y="92765"/>
-            <a:ext cx="10353762" cy="1257300"/>
-          </a:xfrm>
-        </p:spPr>
-        <p:txBody>
-          <a:bodyPr>
-            <a:normAutofit/>
-          </a:bodyPr>
-          <a:lstStyle/>
-          <a:p>
-            <a:r>
-              <a:rPr lang="en-US" sz="1800" dirty="0">
-                <a:effectLst/>
-                <a:latin typeface="Aptos" panose="020B0004020202020204" pitchFamily="34" charset="0"/>
-                <a:ea typeface="Aptos" panose="020B0004020202020204" pitchFamily="34" charset="0"/>
-                <a:cs typeface="Times New Roman" panose="02020603050405020304" pitchFamily="18" charset="0"/>
-              </a:rPr>
-              <a:t>Placeholder for </a:t>
-            </a:r>
-            <a:r>
-              <a:rPr lang="en-US" sz="1800" dirty="0" err="1">
-                <a:effectLst/>
-                <a:latin typeface="Aptos" panose="020B0004020202020204" pitchFamily="34" charset="0"/>
-                <a:ea typeface="Aptos" panose="020B0004020202020204" pitchFamily="34" charset="0"/>
-                <a:cs typeface="Times New Roman" panose="02020603050405020304" pitchFamily="18" charset="0"/>
-              </a:rPr>
-              <a:t>comsumption</a:t>
-            </a:r>
-            <a:endParaRPr lang="en-US" sz="2400" dirty="0"/>
-          </a:p>
-        </p:txBody>
-      </p:sp>
-      <p:sp>
-        <p:nvSpPr>
-          <p:cNvPr id="5" name="TextBox 4">
-            <a:extLst>
-              <a:ext uri="{FF2B5EF4-FFF2-40B4-BE49-F238E27FC236}">
-                <a16:creationId xmlns:a16="http://schemas.microsoft.com/office/drawing/2014/main" id="{D1E369A4-07E9-E30A-5237-6149C7EAC6BF}"/>
-              </a:ext>
-            </a:extLst>
-          </p:cNvPr>
-          <p:cNvSpPr txBox="1"/>
-          <p:nvPr/>
-        </p:nvSpPr>
-        <p:spPr>
-          <a:xfrm>
-            <a:off x="391886" y="2573383"/>
-            <a:ext cx="11234057" cy="1267655"/>
-          </a:xfrm>
-          <a:prstGeom prst="rect">
-            <a:avLst/>
-          </a:prstGeom>
-          <a:noFill/>
-        </p:spPr>
-        <p:txBody>
-          <a:bodyPr wrap="square" rtlCol="0">
-            <a:spAutoFit/>
-          </a:bodyPr>
-          <a:lstStyle/>
-          <a:p>
-            <a:pPr marL="342900" marR="0" lvl="0" indent="-342900">
-              <a:lnSpc>
-                <a:spcPct val="107000"/>
-              </a:lnSpc>
-              <a:spcBef>
-                <a:spcPts val="0"/>
-              </a:spcBef>
-              <a:spcAft>
-                <a:spcPts val="800"/>
-              </a:spcAft>
-              <a:buFont typeface="Aptos" panose="020B0004020202020204" pitchFamily="34" charset="0"/>
-              <a:buChar char="-"/>
-            </a:pPr>
-            <a:r>
-              <a:rPr lang="en-US" sz="1800" dirty="0">
-                <a:effectLst/>
-                <a:latin typeface="Aptos" panose="020B0004020202020204" pitchFamily="34" charset="0"/>
-                <a:ea typeface="Aptos" panose="020B0004020202020204" pitchFamily="34" charset="0"/>
-                <a:cs typeface="Times New Roman" panose="02020603050405020304" pitchFamily="18" charset="0"/>
-              </a:rPr>
-              <a:t>No, it does not. What countries produce the most coffee and does NOT impact the quality of coffee produced. All of the scores are so closely related it does not appear to influence the quality even where there is a lot more of production of coffee like Brazil, they are still neck and neck with Panama, Haiti, Malawi who have barely any production of coffee in comparison. </a:t>
-            </a:r>
-            <a:endParaRPr lang="en-US" sz="1800" kern="100" dirty="0">
-              <a:effectLst/>
-              <a:latin typeface="Aptos" panose="020B0004020202020204" pitchFamily="34" charset="0"/>
-              <a:ea typeface="Aptos" panose="020B0004020202020204" pitchFamily="34" charset="0"/>
-              <a:cs typeface="Times New Roman" panose="02020603050405020304" pitchFamily="18" charset="0"/>
-            </a:endParaRPr>
-          </a:p>
-        </p:txBody>
-      </p:sp>
-    </p:spTree>
-    <p:extLst>
-      <p:ext uri="{BB962C8B-B14F-4D97-AF65-F5344CB8AC3E}">
-        <p14:creationId xmlns:p14="http://schemas.microsoft.com/office/powerpoint/2010/main" val="2874767483"/>
       </p:ext>
     </p:extLst>
   </p:cSld>
@@ -7806,6 +8532,292 @@
 </p:sld>
 </file>
 
+<file path=ppt/slides/slide20.xml><?xml version="1.0" encoding="utf-8"?>
+<p:sld xmlns:a="http://schemas.openxmlformats.org/drawingml/2006/main" xmlns:r="http://schemas.openxmlformats.org/officeDocument/2006/relationships" xmlns:p="http://schemas.openxmlformats.org/presentationml/2006/main">
+  <p:cSld>
+    <p:spTree>
+      <p:nvGrpSpPr>
+        <p:cNvPr id="1" name=""/>
+        <p:cNvGrpSpPr/>
+        <p:nvPr/>
+      </p:nvGrpSpPr>
+      <p:grpSpPr>
+        <a:xfrm>
+          <a:off x="0" y="0"/>
+          <a:ext cx="0" cy="0"/>
+          <a:chOff x="0" y="0"/>
+          <a:chExt cx="0" cy="0"/>
+        </a:xfrm>
+      </p:grpSpPr>
+      <p:sp>
+        <p:nvSpPr>
+          <p:cNvPr id="2" name="Title 1">
+            <a:extLst>
+              <a:ext uri="{FF2B5EF4-FFF2-40B4-BE49-F238E27FC236}">
+                <a16:creationId xmlns:a16="http://schemas.microsoft.com/office/drawing/2014/main" id="{4E50B996-81AE-4E75-1F3D-1FBFBC318B4A}"/>
+              </a:ext>
+            </a:extLst>
+          </p:cNvPr>
+          <p:cNvSpPr>
+            <a:spLocks noGrp="1"/>
+          </p:cNvSpPr>
+          <p:nvPr>
+            <p:ph type="title"/>
+          </p:nvPr>
+        </p:nvSpPr>
+        <p:spPr>
+          <a:xfrm>
+            <a:off x="850185" y="92765"/>
+            <a:ext cx="10353762" cy="1257300"/>
+          </a:xfrm>
+        </p:spPr>
+        <p:txBody>
+          <a:bodyPr>
+            <a:normAutofit/>
+          </a:bodyPr>
+          <a:lstStyle/>
+          <a:p>
+            <a:r>
+              <a:rPr lang="en-US" sz="1800" dirty="0">
+                <a:effectLst/>
+                <a:latin typeface="Aptos" panose="020B0004020202020204" pitchFamily="34" charset="0"/>
+                <a:ea typeface="Aptos" panose="020B0004020202020204" pitchFamily="34" charset="0"/>
+                <a:cs typeface="Times New Roman" panose="02020603050405020304" pitchFamily="18" charset="0"/>
+              </a:rPr>
+              <a:t>Answer to question: </a:t>
+            </a:r>
+            <a:br>
+              <a:rPr lang="en-US" sz="1800" dirty="0">
+                <a:effectLst/>
+                <a:latin typeface="Aptos" panose="020B0004020202020204" pitchFamily="34" charset="0"/>
+                <a:ea typeface="Aptos" panose="020B0004020202020204" pitchFamily="34" charset="0"/>
+                <a:cs typeface="Times New Roman" panose="02020603050405020304" pitchFamily="18" charset="0"/>
+              </a:rPr>
+            </a:br>
+            <a:r>
+              <a:rPr lang="en-US" sz="1800" dirty="0">
+                <a:effectLst/>
+                <a:latin typeface="Aptos" panose="020B0004020202020204" pitchFamily="34" charset="0"/>
+                <a:ea typeface="Aptos" panose="020B0004020202020204" pitchFamily="34" charset="0"/>
+                <a:cs typeface="Times New Roman" panose="02020603050405020304" pitchFamily="18" charset="0"/>
+              </a:rPr>
+              <a:t>What countries produce the most coffee and does that affect the quality of coffee produced?</a:t>
+            </a:r>
+            <a:endParaRPr lang="en-US" sz="2400" dirty="0"/>
+          </a:p>
+        </p:txBody>
+      </p:sp>
+      <p:sp>
+        <p:nvSpPr>
+          <p:cNvPr id="5" name="TextBox 4">
+            <a:extLst>
+              <a:ext uri="{FF2B5EF4-FFF2-40B4-BE49-F238E27FC236}">
+                <a16:creationId xmlns:a16="http://schemas.microsoft.com/office/drawing/2014/main" id="{D1E369A4-07E9-E30A-5237-6149C7EAC6BF}"/>
+              </a:ext>
+            </a:extLst>
+          </p:cNvPr>
+          <p:cNvSpPr txBox="1"/>
+          <p:nvPr/>
+        </p:nvSpPr>
+        <p:spPr>
+          <a:xfrm>
+            <a:off x="391886" y="2573383"/>
+            <a:ext cx="11234057" cy="1267655"/>
+          </a:xfrm>
+          <a:prstGeom prst="rect">
+            <a:avLst/>
+          </a:prstGeom>
+          <a:noFill/>
+        </p:spPr>
+        <p:txBody>
+          <a:bodyPr wrap="square" rtlCol="0">
+            <a:spAutoFit/>
+          </a:bodyPr>
+          <a:lstStyle/>
+          <a:p>
+            <a:pPr marL="342900" marR="0" lvl="0" indent="-342900">
+              <a:lnSpc>
+                <a:spcPct val="107000"/>
+              </a:lnSpc>
+              <a:spcBef>
+                <a:spcPts val="0"/>
+              </a:spcBef>
+              <a:spcAft>
+                <a:spcPts val="800"/>
+              </a:spcAft>
+              <a:buFont typeface="Aptos" panose="020B0004020202020204" pitchFamily="34" charset="0"/>
+              <a:buChar char="-"/>
+            </a:pPr>
+            <a:r>
+              <a:rPr lang="en-US" sz="1800" dirty="0">
+                <a:effectLst/>
+                <a:latin typeface="Aptos" panose="020B0004020202020204" pitchFamily="34" charset="0"/>
+                <a:ea typeface="Aptos" panose="020B0004020202020204" pitchFamily="34" charset="0"/>
+                <a:cs typeface="Times New Roman" panose="02020603050405020304" pitchFamily="18" charset="0"/>
+              </a:rPr>
+              <a:t>No, it does not. What countries produce the most coffee and does NOT impact the quality of coffee produced. All of the scores are so closely related it does not appear to influence the quality even where there is a lot more of production of coffee like Brazil, they are still neck and neck with Panama, Haiti, Malawi who have barely any production of coffee in comparison. </a:t>
+            </a:r>
+            <a:endParaRPr lang="en-US" sz="1800" kern="100" dirty="0">
+              <a:effectLst/>
+              <a:latin typeface="Aptos" panose="020B0004020202020204" pitchFamily="34" charset="0"/>
+              <a:ea typeface="Aptos" panose="020B0004020202020204" pitchFamily="34" charset="0"/>
+              <a:cs typeface="Times New Roman" panose="02020603050405020304" pitchFamily="18" charset="0"/>
+            </a:endParaRPr>
+          </a:p>
+        </p:txBody>
+      </p:sp>
+    </p:spTree>
+    <p:extLst>
+      <p:ext uri="{BB962C8B-B14F-4D97-AF65-F5344CB8AC3E}">
+        <p14:creationId xmlns:p14="http://schemas.microsoft.com/office/powerpoint/2010/main" val="1212262085"/>
+      </p:ext>
+    </p:extLst>
+  </p:cSld>
+  <p:clrMapOvr>
+    <a:masterClrMapping/>
+  </p:clrMapOvr>
+</p:sld>
+</file>
+
+<file path=ppt/slides/slide21.xml><?xml version="1.0" encoding="utf-8"?>
+<p:sld xmlns:a="http://schemas.openxmlformats.org/drawingml/2006/main" xmlns:r="http://schemas.openxmlformats.org/officeDocument/2006/relationships" xmlns:p="http://schemas.openxmlformats.org/presentationml/2006/main">
+  <p:cSld>
+    <p:spTree>
+      <p:nvGrpSpPr>
+        <p:cNvPr id="1" name=""/>
+        <p:cNvGrpSpPr/>
+        <p:nvPr/>
+      </p:nvGrpSpPr>
+      <p:grpSpPr>
+        <a:xfrm>
+          <a:off x="0" y="0"/>
+          <a:ext cx="0" cy="0"/>
+          <a:chOff x="0" y="0"/>
+          <a:chExt cx="0" cy="0"/>
+        </a:xfrm>
+      </p:grpSpPr>
+      <p:sp>
+        <p:nvSpPr>
+          <p:cNvPr id="2" name="Title 1">
+            <a:extLst>
+              <a:ext uri="{FF2B5EF4-FFF2-40B4-BE49-F238E27FC236}">
+                <a16:creationId xmlns:a16="http://schemas.microsoft.com/office/drawing/2014/main" id="{4E50B996-81AE-4E75-1F3D-1FBFBC318B4A}"/>
+              </a:ext>
+            </a:extLst>
+          </p:cNvPr>
+          <p:cNvSpPr>
+            <a:spLocks noGrp="1"/>
+          </p:cNvSpPr>
+          <p:nvPr>
+            <p:ph type="title"/>
+          </p:nvPr>
+        </p:nvSpPr>
+        <p:spPr>
+          <a:xfrm>
+            <a:off x="850185" y="92765"/>
+            <a:ext cx="10353762" cy="1257300"/>
+          </a:xfrm>
+        </p:spPr>
+        <p:txBody>
+          <a:bodyPr>
+            <a:normAutofit/>
+          </a:bodyPr>
+          <a:lstStyle/>
+          <a:p>
+            <a:r>
+              <a:rPr lang="en-US" sz="1800" dirty="0">
+                <a:effectLst/>
+                <a:latin typeface="Aptos" panose="020B0004020202020204" pitchFamily="34" charset="0"/>
+                <a:ea typeface="Aptos" panose="020B0004020202020204" pitchFamily="34" charset="0"/>
+                <a:cs typeface="Times New Roman" panose="02020603050405020304" pitchFamily="18" charset="0"/>
+              </a:rPr>
+              <a:t>Placeholder for </a:t>
+            </a:r>
+            <a:r>
+              <a:rPr lang="en-US" sz="1800" dirty="0" err="1">
+                <a:effectLst/>
+                <a:latin typeface="Aptos" panose="020B0004020202020204" pitchFamily="34" charset="0"/>
+                <a:ea typeface="Aptos" panose="020B0004020202020204" pitchFamily="34" charset="0"/>
+                <a:cs typeface="Times New Roman" panose="02020603050405020304" pitchFamily="18" charset="0"/>
+              </a:rPr>
+              <a:t>comsumption</a:t>
+            </a:r>
+            <a:endParaRPr lang="en-US" sz="2400" dirty="0"/>
+          </a:p>
+        </p:txBody>
+      </p:sp>
+      <p:sp>
+        <p:nvSpPr>
+          <p:cNvPr id="5" name="TextBox 4">
+            <a:extLst>
+              <a:ext uri="{FF2B5EF4-FFF2-40B4-BE49-F238E27FC236}">
+                <a16:creationId xmlns:a16="http://schemas.microsoft.com/office/drawing/2014/main" id="{D1E369A4-07E9-E30A-5237-6149C7EAC6BF}"/>
+              </a:ext>
+            </a:extLst>
+          </p:cNvPr>
+          <p:cNvSpPr txBox="1"/>
+          <p:nvPr/>
+        </p:nvSpPr>
+        <p:spPr>
+          <a:xfrm>
+            <a:off x="391886" y="2573383"/>
+            <a:ext cx="11234057" cy="1267655"/>
+          </a:xfrm>
+          <a:prstGeom prst="rect">
+            <a:avLst/>
+          </a:prstGeom>
+          <a:noFill/>
+        </p:spPr>
+        <p:txBody>
+          <a:bodyPr wrap="square" rtlCol="0">
+            <a:spAutoFit/>
+          </a:bodyPr>
+          <a:lstStyle/>
+          <a:p>
+            <a:pPr marL="342900" marR="0" lvl="0" indent="-342900">
+              <a:lnSpc>
+                <a:spcPct val="107000"/>
+              </a:lnSpc>
+              <a:spcBef>
+                <a:spcPts val="0"/>
+              </a:spcBef>
+              <a:spcAft>
+                <a:spcPts val="800"/>
+              </a:spcAft>
+              <a:buFont typeface="Aptos" panose="020B0004020202020204" pitchFamily="34" charset="0"/>
+              <a:buChar char="-"/>
+            </a:pPr>
+            <a:r>
+              <a:rPr lang="en-US" sz="1800" dirty="0">
+                <a:effectLst/>
+                <a:latin typeface="Aptos" panose="020B0004020202020204" pitchFamily="34" charset="0"/>
+                <a:ea typeface="Aptos" panose="020B0004020202020204" pitchFamily="34" charset="0"/>
+                <a:cs typeface="Times New Roman" panose="02020603050405020304" pitchFamily="18" charset="0"/>
+              </a:rPr>
+              <a:t>No, it does not. What countries produce the most coffee and does NOT impact the quality of coffee produced. All of the scores are so closely related it does not appear to influence the quality even where there is a lot more of production of coffee like Brazil, they are still neck and neck with Panama, Haiti, Malawi who have barely any production of coffee in comparison. </a:t>
+            </a:r>
+            <a:endParaRPr lang="en-US" sz="1800" kern="100" dirty="0">
+              <a:effectLst/>
+              <a:latin typeface="Aptos" panose="020B0004020202020204" pitchFamily="34" charset="0"/>
+              <a:ea typeface="Aptos" panose="020B0004020202020204" pitchFamily="34" charset="0"/>
+              <a:cs typeface="Times New Roman" panose="02020603050405020304" pitchFamily="18" charset="0"/>
+            </a:endParaRPr>
+          </a:p>
+        </p:txBody>
+      </p:sp>
+    </p:spTree>
+    <p:extLst>
+      <p:ext uri="{BB962C8B-B14F-4D97-AF65-F5344CB8AC3E}">
+        <p14:creationId xmlns:p14="http://schemas.microsoft.com/office/powerpoint/2010/main" val="2874767483"/>
+      </p:ext>
+    </p:extLst>
+  </p:cSld>
+  <p:clrMapOvr>
+    <a:masterClrMapping/>
+  </p:clrMapOvr>
+</p:sld>
+</file>
+
 <file path=ppt/slides/slide3.xml><?xml version="1.0" encoding="utf-8"?>
 <p:sld xmlns:a="http://schemas.openxmlformats.org/drawingml/2006/main" xmlns:r="http://schemas.openxmlformats.org/officeDocument/2006/relationships" xmlns:p="http://schemas.openxmlformats.org/presentationml/2006/main">
   <p:cSld>
@@ -8517,73 +9529,6 @@
           <a:chExt cx="0" cy="0"/>
         </a:xfrm>
       </p:grpSpPr>
-      <p:sp>
-        <p:nvSpPr>
-          <p:cNvPr id="2" name="Title 1">
-            <a:extLst>
-              <a:ext uri="{FF2B5EF4-FFF2-40B4-BE49-F238E27FC236}">
-                <a16:creationId xmlns:a16="http://schemas.microsoft.com/office/drawing/2014/main" id="{4E50B996-81AE-4E75-1F3D-1FBFBC318B4A}"/>
-              </a:ext>
-            </a:extLst>
-          </p:cNvPr>
-          <p:cNvSpPr>
-            <a:spLocks noGrp="1"/>
-          </p:cNvSpPr>
-          <p:nvPr>
-            <p:ph type="title"/>
-          </p:nvPr>
-        </p:nvSpPr>
-        <p:spPr>
-          <a:xfrm>
-            <a:off x="850185" y="92765"/>
-            <a:ext cx="10353762" cy="1257300"/>
-          </a:xfrm>
-        </p:spPr>
-        <p:txBody>
-          <a:bodyPr>
-            <a:normAutofit/>
-          </a:bodyPr>
-          <a:lstStyle/>
-          <a:p>
-            <a:endParaRPr lang="en-US" sz="2400" dirty="0"/>
-          </a:p>
-        </p:txBody>
-      </p:sp>
-      <p:sp>
-        <p:nvSpPr>
-          <p:cNvPr id="5" name="TextBox 4">
-            <a:extLst>
-              <a:ext uri="{FF2B5EF4-FFF2-40B4-BE49-F238E27FC236}">
-                <a16:creationId xmlns:a16="http://schemas.microsoft.com/office/drawing/2014/main" id="{D1E369A4-07E9-E30A-5237-6149C7EAC6BF}"/>
-              </a:ext>
-            </a:extLst>
-          </p:cNvPr>
-          <p:cNvSpPr txBox="1"/>
-          <p:nvPr/>
-        </p:nvSpPr>
-        <p:spPr>
-          <a:xfrm>
-            <a:off x="1025718" y="5701085"/>
-            <a:ext cx="10861482" cy="954107"/>
-          </a:xfrm>
-          <a:prstGeom prst="rect">
-            <a:avLst/>
-          </a:prstGeom>
-          <a:noFill/>
-        </p:spPr>
-        <p:txBody>
-          <a:bodyPr wrap="square" rtlCol="0">
-            <a:spAutoFit/>
-          </a:bodyPr>
-          <a:lstStyle/>
-          <a:p>
-            <a:r>
-              <a:rPr lang="en-US" sz="1400" dirty="0"/>
-              <a:t>Comments on Avg Annual Rainfall vs quality of coffee : Here, the null hypothesis is that coffee quality and avg rainfall among the coffee producing countries have nothing to do with one another. The p value turns out to be about 0.15, so we cannot reject this null hypothesis. Most coffee producing regions do get significant rainfall, but the variance within this group of coffee producing nations does not appear to significantly affect the quality of coffee produced. </a:t>
-            </a:r>
-          </a:p>
-        </p:txBody>
-      </p:sp>
       <p:pic>
         <p:nvPicPr>
           <p:cNvPr id="8" name="Picture 7" descr="A graph of a number of people&#10;&#10;Description automatically generated with medium confidence">
@@ -8612,12 +9557,23 @@
         </p:blipFill>
         <p:spPr>
           <a:xfrm>
-            <a:off x="1900596" y="347929"/>
-            <a:ext cx="8112536" cy="5125615"/>
+            <a:off x="494770" y="68263"/>
+            <a:ext cx="11202459" cy="6721475"/>
           </a:xfrm>
           <a:prstGeom prst="rect">
             <a:avLst/>
           </a:prstGeom>
+          <a:noFill/>
+          <a:ln>
+            <a:noFill/>
+          </a:ln>
+          <a:effectLst>
+            <a:outerShdw blurRad="292100" dist="139700" dir="2700000" algn="tl" rotWithShape="0">
+              <a:srgbClr val="333333">
+                <a:alpha val="65000"/>
+              </a:srgbClr>
+            </a:outerShdw>
+          </a:effectLst>
         </p:spPr>
       </p:pic>
     </p:spTree>
@@ -8650,12 +9606,58 @@
           <a:chExt cx="0" cy="0"/>
         </a:xfrm>
       </p:grpSpPr>
+      <p:sp>
+        <p:nvSpPr>
+          <p:cNvPr id="8" name="Title 1">
+            <a:extLst>
+              <a:ext uri="{FF2B5EF4-FFF2-40B4-BE49-F238E27FC236}">
+                <a16:creationId xmlns:a16="http://schemas.microsoft.com/office/drawing/2014/main" id="{79A1700D-FD9E-29D8-1BFA-96FC3C7A28AA}"/>
+              </a:ext>
+            </a:extLst>
+          </p:cNvPr>
+          <p:cNvSpPr>
+            <a:spLocks noGrp="1"/>
+          </p:cNvSpPr>
+          <p:nvPr>
+            <p:ph type="title"/>
+          </p:nvPr>
+        </p:nvSpPr>
+        <p:spPr>
+          <a:xfrm>
+            <a:off x="913795" y="609600"/>
+            <a:ext cx="3706889" cy="1821918"/>
+          </a:xfrm>
+        </p:spPr>
+        <p:txBody>
+          <a:bodyPr vert="horz" lIns="91440" tIns="45720" rIns="91440" bIns="45720" rtlCol="0" anchor="b">
+            <a:normAutofit/>
+          </a:bodyPr>
+          <a:lstStyle/>
+          <a:p>
+            <a:r>
+              <a:rPr lang="en-US" b="0" kern="1200">
+                <a:effectLst>
+                  <a:outerShdw blurRad="9525" dist="25400" dir="14640000" algn="tl" rotWithShape="0">
+                    <a:schemeClr val="bg1">
+                      <a:alpha val="30000"/>
+                    </a:schemeClr>
+                  </a:outerShdw>
+                </a:effectLst>
+                <a:latin typeface="+mj-lt"/>
+                <a:ea typeface="+mj-ea"/>
+                <a:cs typeface="Trebuchet MS"/>
+              </a:rPr>
+              <a:t>Top 5 Countries of Production</a:t>
+            </a:r>
+          </a:p>
+        </p:txBody>
+      </p:sp>
       <p:pic>
         <p:nvPicPr>
-          <p:cNvPr id="7" name="Picture 6" descr="A graph of blue rectangular bars&#10;&#10;Description automatically generated with medium confidence">
+          <p:cNvPr id="4" name="Picture 3" descr="A graph of a number of blue bars&#10;&#10;Description automatically generated">
             <a:extLst>
               <a:ext uri="{FF2B5EF4-FFF2-40B4-BE49-F238E27FC236}">
-                <a16:creationId xmlns:a16="http://schemas.microsoft.com/office/drawing/2014/main" id="{BCD64477-8F48-5A71-0852-94D56F73196C}"/>
+                <a16:creationId xmlns:a16="http://schemas.microsoft.com/office/drawing/2014/main" id="{544EF777-4FD6-3B1A-B255-7EDBD1D09943}"/>
               </a:ext>
             </a:extLst>
           </p:cNvPr>
@@ -8678,52 +9680,21 @@
         </p:blipFill>
         <p:spPr>
           <a:xfrm>
-            <a:off x="1523991" y="0"/>
-            <a:ext cx="9144018" cy="5701085"/>
+            <a:off x="4855633" y="1226023"/>
+            <a:ext cx="6411924" cy="3847154"/>
           </a:xfrm>
           <a:prstGeom prst="rect">
             <a:avLst/>
           </a:prstGeom>
+          <a:noFill/>
         </p:spPr>
       </p:pic>
       <p:sp>
         <p:nvSpPr>
-          <p:cNvPr id="2" name="Title 1">
+          <p:cNvPr id="3" name="TextBox 2">
             <a:extLst>
               <a:ext uri="{FF2B5EF4-FFF2-40B4-BE49-F238E27FC236}">
-                <a16:creationId xmlns:a16="http://schemas.microsoft.com/office/drawing/2014/main" id="{4E50B996-81AE-4E75-1F3D-1FBFBC318B4A}"/>
-              </a:ext>
-            </a:extLst>
-          </p:cNvPr>
-          <p:cNvSpPr>
-            <a:spLocks noGrp="1"/>
-          </p:cNvSpPr>
-          <p:nvPr>
-            <p:ph type="title"/>
-          </p:nvPr>
-        </p:nvSpPr>
-        <p:spPr>
-          <a:xfrm>
-            <a:off x="850185" y="92765"/>
-            <a:ext cx="10353762" cy="1257300"/>
-          </a:xfrm>
-        </p:spPr>
-        <p:txBody>
-          <a:bodyPr>
-            <a:normAutofit/>
-          </a:bodyPr>
-          <a:lstStyle/>
-          <a:p>
-            <a:endParaRPr lang="en-US" sz="2400" dirty="0"/>
-          </a:p>
-        </p:txBody>
-      </p:sp>
-      <p:sp>
-        <p:nvSpPr>
-          <p:cNvPr id="5" name="TextBox 4">
-            <a:extLst>
-              <a:ext uri="{FF2B5EF4-FFF2-40B4-BE49-F238E27FC236}">
-                <a16:creationId xmlns:a16="http://schemas.microsoft.com/office/drawing/2014/main" id="{D1E369A4-07E9-E30A-5237-6149C7EAC6BF}"/>
+                <a16:creationId xmlns:a16="http://schemas.microsoft.com/office/drawing/2014/main" id="{7383A721-BC00-1BE8-83FA-A81C29FC8DEC}"/>
               </a:ext>
             </a:extLst>
           </p:cNvPr>
@@ -8732,24 +9703,153 @@
         </p:nvSpPr>
         <p:spPr>
           <a:xfrm>
-            <a:off x="1025718" y="5701085"/>
-            <a:ext cx="10861482" cy="954107"/>
+            <a:off x="913795" y="2673351"/>
+            <a:ext cx="3706889" cy="3016250"/>
           </a:xfrm>
           <a:prstGeom prst="rect">
             <a:avLst/>
           </a:prstGeom>
-          <a:noFill/>
-        </p:spPr>
-        <p:txBody>
-          <a:bodyPr wrap="square" rtlCol="0">
-            <a:spAutoFit/>
+          <a:effectLst>
+            <a:outerShdw blurRad="25400" dir="17880000">
+              <a:srgbClr val="000000">
+                <a:alpha val="46000"/>
+              </a:srgbClr>
+            </a:outerShdw>
+          </a:effectLst>
+        </p:spPr>
+        <p:txBody>
+          <a:bodyPr vert="horz" lIns="91440" tIns="45720" rIns="91440" bIns="45720" rtlCol="0" anchor="t">
+            <a:normAutofit/>
           </a:bodyPr>
           <a:lstStyle/>
           <a:p>
-            <a:r>
-              <a:rPr lang="en-US" sz="1400" dirty="0"/>
-              <a:t>Comments on Avg Annual Rainfall vs quality of coffee : Here, the null hypothesis is that coffee quality and avg rainfall among the coffee producing countries have nothing to do with one another. The p value turns out to be about 0.15, so we cannot reject this null hypothesis. Most coffee producing regions do get significant rainfall, but the variance within this group of coffee producing nations does not appear to significantly affect the quality of coffee produced. </a:t>
-            </a:r>
+            <a:pPr algn="ctr" defTabSz="457200">
+              <a:lnSpc>
+                <a:spcPct val="110000"/>
+              </a:lnSpc>
+              <a:spcBef>
+                <a:spcPct val="20000"/>
+              </a:spcBef>
+              <a:spcAft>
+                <a:spcPts val="600"/>
+              </a:spcAft>
+              <a:buClr>
+                <a:schemeClr val="tx2"/>
+              </a:buClr>
+              <a:buSzPct val="70000"/>
+            </a:pPr>
+            <a:r>
+              <a:rPr lang="en-US" sz="1600" kern="1200">
+                <a:ln>
+                  <a:solidFill>
+                    <a:schemeClr val="bg1">
+                      <a:lumMod val="75000"/>
+                      <a:lumOff val="25000"/>
+                      <a:alpha val="10000"/>
+                    </a:schemeClr>
+                  </a:solidFill>
+                </a:ln>
+                <a:solidFill>
+                  <a:schemeClr val="tx2"/>
+                </a:solidFill>
+                <a:effectLst>
+                  <a:outerShdw blurRad="9525" dist="25400" dir="14640000" algn="tl" rotWithShape="0">
+                    <a:schemeClr val="bg1">
+                      <a:alpha val="30000"/>
+                    </a:schemeClr>
+                  </a:outerShdw>
+                </a:effectLst>
+                <a:latin typeface="+mn-lt"/>
+                <a:ea typeface="+mn-ea"/>
+                <a:cs typeface="+mn-cs"/>
+              </a:rPr>
+              <a:t>Brazil comes in first place with the most coffee production.</a:t>
+            </a:r>
+          </a:p>
+          <a:p>
+            <a:pPr algn="ctr" defTabSz="457200">
+              <a:lnSpc>
+                <a:spcPct val="110000"/>
+              </a:lnSpc>
+              <a:spcBef>
+                <a:spcPct val="20000"/>
+              </a:spcBef>
+              <a:spcAft>
+                <a:spcPts val="600"/>
+              </a:spcAft>
+              <a:buClr>
+                <a:schemeClr val="tx2"/>
+              </a:buClr>
+              <a:buSzPct val="70000"/>
+            </a:pPr>
+            <a:r>
+              <a:rPr lang="en-US" sz="1600" kern="1200">
+                <a:ln>
+                  <a:solidFill>
+                    <a:schemeClr val="bg1">
+                      <a:lumMod val="75000"/>
+                      <a:lumOff val="25000"/>
+                      <a:alpha val="10000"/>
+                    </a:schemeClr>
+                  </a:solidFill>
+                </a:ln>
+                <a:solidFill>
+                  <a:schemeClr val="tx2"/>
+                </a:solidFill>
+                <a:effectLst>
+                  <a:outerShdw blurRad="9525" dist="25400" dir="14640000" algn="tl" rotWithShape="0">
+                    <a:schemeClr val="bg1">
+                      <a:alpha val="30000"/>
+                    </a:schemeClr>
+                  </a:outerShdw>
+                </a:effectLst>
+                <a:latin typeface="+mn-lt"/>
+                <a:ea typeface="+mn-ea"/>
+                <a:cs typeface="+mn-cs"/>
+              </a:rPr>
+              <a:t>Almost out producing the next four top countries combined </a:t>
+            </a:r>
+          </a:p>
+          <a:p>
+            <a:pPr algn="ctr" defTabSz="457200">
+              <a:lnSpc>
+                <a:spcPct val="110000"/>
+              </a:lnSpc>
+              <a:spcBef>
+                <a:spcPct val="20000"/>
+              </a:spcBef>
+              <a:spcAft>
+                <a:spcPts val="600"/>
+              </a:spcAft>
+              <a:buClr>
+                <a:schemeClr val="tx2"/>
+              </a:buClr>
+              <a:buSzPct val="70000"/>
+            </a:pPr>
+            <a:endParaRPr lang="en-US" sz="1600" kern="1200">
+              <a:ln>
+                <a:solidFill>
+                  <a:schemeClr val="bg1">
+                    <a:lumMod val="75000"/>
+                    <a:lumOff val="25000"/>
+                    <a:alpha val="10000"/>
+                  </a:schemeClr>
+                </a:solidFill>
+              </a:ln>
+              <a:solidFill>
+                <a:schemeClr val="tx2"/>
+              </a:solidFill>
+              <a:effectLst>
+                <a:outerShdw blurRad="9525" dist="25400" dir="14640000" algn="tl" rotWithShape="0">
+                  <a:schemeClr val="bg1">
+                    <a:alpha val="30000"/>
+                  </a:schemeClr>
+                </a:outerShdw>
+              </a:effectLst>
+              <a:latin typeface="+mn-lt"/>
+              <a:ea typeface="+mn-ea"/>
+              <a:cs typeface="+mn-cs"/>
+            </a:endParaRPr>
           </a:p>
         </p:txBody>
       </p:sp>

</xml_diff>